<commit_message>
Added Writer and Deployer User's Guide
</commit_message>
<xml_diff>
--- a/dict/images/dict_images.pptx
+++ b/dict/images/dict_images.pptx
@@ -5,7 +5,7 @@
     <p:sldMasterId id="2147483648" r:id="rId1"/>
   </p:sldMasterIdLst>
   <p:notesMasterIdLst>
-    <p:notesMasterId r:id="rId19"/>
+    <p:notesMasterId r:id="rId20"/>
   </p:notesMasterIdLst>
   <p:sldIdLst>
     <p:sldId id="257" r:id="rId2"/>
@@ -25,6 +25,7 @@
     <p:sldId id="271" r:id="rId16"/>
     <p:sldId id="272" r:id="rId17"/>
     <p:sldId id="273" r:id="rId18"/>
+    <p:sldId id="274" r:id="rId19"/>
   </p:sldIdLst>
   <p:sldSz cx="9144000" cy="6858000" type="screen4x3"/>
   <p:notesSz cx="6858000" cy="9144000"/>
@@ -208,7 +209,7 @@
           <a:p>
             <a:fld id="{E518BEE2-82B8-4744-9B91-6E4A37190181}" type="datetimeFigureOut">
               <a:rPr kumimoji="1" lang="ja-JP" altLang="en-US" smtClean="0"/>
-              <a:t>2016/8/29</a:t>
+              <a:t>2016/9/5</a:t>
             </a:fld>
             <a:endParaRPr kumimoji="1" lang="ja-JP" altLang="en-US"/>
           </a:p>
@@ -773,7 +774,7 @@
           <a:p>
             <a:fld id="{E90ED720-0104-4369-84BC-D37694168613}" type="datetimeFigureOut">
               <a:rPr kumimoji="1" lang="ja-JP" altLang="en-US" smtClean="0"/>
-              <a:t>2016/8/29</a:t>
+              <a:t>2016/9/5</a:t>
             </a:fld>
             <a:endParaRPr kumimoji="1" lang="ja-JP" altLang="en-US"/>
           </a:p>
@@ -970,7 +971,7 @@
           <a:p>
             <a:fld id="{E90ED720-0104-4369-84BC-D37694168613}" type="datetimeFigureOut">
               <a:rPr kumimoji="1" lang="ja-JP" altLang="en-US" smtClean="0"/>
-              <a:t>2016/8/29</a:t>
+              <a:t>2016/9/5</a:t>
             </a:fld>
             <a:endParaRPr kumimoji="1" lang="ja-JP" altLang="en-US"/>
           </a:p>
@@ -1177,7 +1178,7 @@
           <a:p>
             <a:fld id="{E90ED720-0104-4369-84BC-D37694168613}" type="datetimeFigureOut">
               <a:rPr kumimoji="1" lang="ja-JP" altLang="en-US" smtClean="0"/>
-              <a:t>2016/8/29</a:t>
+              <a:t>2016/9/5</a:t>
             </a:fld>
             <a:endParaRPr kumimoji="1" lang="ja-JP" altLang="en-US"/>
           </a:p>
@@ -1374,7 +1375,7 @@
           <a:p>
             <a:fld id="{E90ED720-0104-4369-84BC-D37694168613}" type="datetimeFigureOut">
               <a:rPr kumimoji="1" lang="ja-JP" altLang="en-US" smtClean="0"/>
-              <a:t>2016/8/29</a:t>
+              <a:t>2016/9/5</a:t>
             </a:fld>
             <a:endParaRPr kumimoji="1" lang="ja-JP" altLang="en-US"/>
           </a:p>
@@ -1615,7 +1616,7 @@
           <a:p>
             <a:fld id="{E90ED720-0104-4369-84BC-D37694168613}" type="datetimeFigureOut">
               <a:rPr kumimoji="1" lang="ja-JP" altLang="en-US" smtClean="0"/>
-              <a:t>2016/8/29</a:t>
+              <a:t>2016/9/5</a:t>
             </a:fld>
             <a:endParaRPr kumimoji="1" lang="ja-JP" altLang="en-US"/>
           </a:p>
@@ -1962,7 +1963,7 @@
           <a:p>
             <a:fld id="{E90ED720-0104-4369-84BC-D37694168613}" type="datetimeFigureOut">
               <a:rPr kumimoji="1" lang="ja-JP" altLang="en-US" smtClean="0"/>
-              <a:t>2016/8/29</a:t>
+              <a:t>2016/9/5</a:t>
             </a:fld>
             <a:endParaRPr kumimoji="1" lang="ja-JP" altLang="en-US"/>
           </a:p>
@@ -2443,7 +2444,7 @@
           <a:p>
             <a:fld id="{E90ED720-0104-4369-84BC-D37694168613}" type="datetimeFigureOut">
               <a:rPr kumimoji="1" lang="ja-JP" altLang="en-US" smtClean="0"/>
-              <a:t>2016/8/29</a:t>
+              <a:t>2016/9/5</a:t>
             </a:fld>
             <a:endParaRPr kumimoji="1" lang="ja-JP" altLang="en-US"/>
           </a:p>
@@ -2556,7 +2557,7 @@
           <a:p>
             <a:fld id="{E90ED720-0104-4369-84BC-D37694168613}" type="datetimeFigureOut">
               <a:rPr kumimoji="1" lang="ja-JP" altLang="en-US" smtClean="0"/>
-              <a:t>2016/8/29</a:t>
+              <a:t>2016/9/5</a:t>
             </a:fld>
             <a:endParaRPr kumimoji="1" lang="ja-JP" altLang="en-US"/>
           </a:p>
@@ -2646,7 +2647,7 @@
           <a:p>
             <a:fld id="{E90ED720-0104-4369-84BC-D37694168613}" type="datetimeFigureOut">
               <a:rPr kumimoji="1" lang="ja-JP" altLang="en-US" smtClean="0"/>
-              <a:t>2016/8/29</a:t>
+              <a:t>2016/9/5</a:t>
             </a:fld>
             <a:endParaRPr kumimoji="1" lang="ja-JP" altLang="en-US"/>
           </a:p>
@@ -2950,7 +2951,7 @@
           <a:p>
             <a:fld id="{E90ED720-0104-4369-84BC-D37694168613}" type="datetimeFigureOut">
               <a:rPr kumimoji="1" lang="ja-JP" altLang="en-US" smtClean="0"/>
-              <a:t>2016/8/29</a:t>
+              <a:t>2016/9/5</a:t>
             </a:fld>
             <a:endParaRPr kumimoji="1" lang="ja-JP" altLang="en-US"/>
           </a:p>
@@ -3198,7 +3199,7 @@
           <a:p>
             <a:fld id="{E90ED720-0104-4369-84BC-D37694168613}" type="datetimeFigureOut">
               <a:rPr kumimoji="1" lang="ja-JP" altLang="en-US" smtClean="0"/>
-              <a:t>2016/8/29</a:t>
+              <a:t>2016/9/5</a:t>
             </a:fld>
             <a:endParaRPr kumimoji="1" lang="ja-JP" altLang="en-US"/>
           </a:p>
@@ -3438,7 +3439,7 @@
           <a:p>
             <a:fld id="{E90ED720-0104-4369-84BC-D37694168613}" type="datetimeFigureOut">
               <a:rPr kumimoji="1" lang="ja-JP" altLang="en-US" smtClean="0"/>
-              <a:t>2016/8/29</a:t>
+              <a:t>2016/9/5</a:t>
             </a:fld>
             <a:endParaRPr kumimoji="1" lang="ja-JP" altLang="en-US"/>
           </a:p>
@@ -29318,14 +29319,6 @@
               </a:rPr>
               <a:t>…</a:t>
             </a:r>
-            <a:endParaRPr lang="en-US" altLang="ja-JP" sz="1100" dirty="0" smtClean="0">
-              <a:solidFill>
-                <a:schemeClr val="tx1">
-                  <a:lumMod val="75000"/>
-                  <a:lumOff val="25000"/>
-                </a:schemeClr>
-              </a:solidFill>
-            </a:endParaRPr>
           </a:p>
         </p:txBody>
       </p:sp>
@@ -29373,14 +29366,6 @@
               </a:rPr>
               <a:t>ecord</a:t>
             </a:r>
-            <a:endParaRPr lang="en-US" altLang="ja-JP" sz="1100" dirty="0" smtClean="0">
-              <a:solidFill>
-                <a:schemeClr val="tx1">
-                  <a:lumMod val="75000"/>
-                  <a:lumOff val="25000"/>
-                </a:schemeClr>
-              </a:solidFill>
-            </a:endParaRPr>
           </a:p>
         </p:txBody>
       </p:sp>
@@ -29417,14 +29402,6 @@
               </a:rPr>
               <a:t>…</a:t>
             </a:r>
-            <a:endParaRPr lang="en-US" altLang="ja-JP" sz="1100" dirty="0" smtClean="0">
-              <a:solidFill>
-                <a:schemeClr val="tx1">
-                  <a:lumMod val="75000"/>
-                  <a:lumOff val="25000"/>
-                </a:schemeClr>
-              </a:solidFill>
-            </a:endParaRPr>
           </a:p>
         </p:txBody>
       </p:sp>
@@ -29737,14 +29714,6 @@
               </a:rPr>
               <a:t>…</a:t>
             </a:r>
-            <a:endParaRPr lang="en-US" altLang="ja-JP" sz="1100" dirty="0" smtClean="0">
-              <a:solidFill>
-                <a:schemeClr val="tx1">
-                  <a:lumMod val="75000"/>
-                  <a:lumOff val="25000"/>
-                </a:schemeClr>
-              </a:solidFill>
-            </a:endParaRPr>
           </a:p>
         </p:txBody>
       </p:sp>
@@ -29792,14 +29761,6 @@
               </a:rPr>
               <a:t>ecord</a:t>
             </a:r>
-            <a:endParaRPr lang="en-US" altLang="ja-JP" sz="1100" dirty="0" smtClean="0">
-              <a:solidFill>
-                <a:schemeClr val="tx1">
-                  <a:lumMod val="75000"/>
-                  <a:lumOff val="25000"/>
-                </a:schemeClr>
-              </a:solidFill>
-            </a:endParaRPr>
           </a:p>
         </p:txBody>
       </p:sp>
@@ -30112,14 +30073,6 @@
               </a:rPr>
               <a:t>…</a:t>
             </a:r>
-            <a:endParaRPr lang="en-US" altLang="ja-JP" sz="1100" dirty="0" smtClean="0">
-              <a:solidFill>
-                <a:schemeClr val="tx1">
-                  <a:lumMod val="75000"/>
-                  <a:lumOff val="25000"/>
-                </a:schemeClr>
-              </a:solidFill>
-            </a:endParaRPr>
           </a:p>
         </p:txBody>
       </p:sp>
@@ -30167,14 +30120,6 @@
               </a:rPr>
               <a:t>ecord</a:t>
             </a:r>
-            <a:endParaRPr lang="en-US" altLang="ja-JP" sz="1100" dirty="0" smtClean="0">
-              <a:solidFill>
-                <a:schemeClr val="tx1">
-                  <a:lumMod val="75000"/>
-                  <a:lumOff val="25000"/>
-                </a:schemeClr>
-              </a:solidFill>
-            </a:endParaRPr>
           </a:p>
         </p:txBody>
       </p:sp>
@@ -30603,14 +30548,6 @@
               </a:rPr>
               <a:t>…</a:t>
             </a:r>
-            <a:endParaRPr lang="en-US" altLang="ja-JP" sz="1100" dirty="0" smtClean="0">
-              <a:solidFill>
-                <a:schemeClr val="tx1">
-                  <a:lumMod val="75000"/>
-                  <a:lumOff val="25000"/>
-                </a:schemeClr>
-              </a:solidFill>
-            </a:endParaRPr>
           </a:p>
         </p:txBody>
       </p:sp>
@@ -30658,14 +30595,6 @@
               </a:rPr>
               <a:t>ecord</a:t>
             </a:r>
-            <a:endParaRPr lang="en-US" altLang="ja-JP" sz="1100" dirty="0" smtClean="0">
-              <a:solidFill>
-                <a:schemeClr val="tx1">
-                  <a:lumMod val="75000"/>
-                  <a:lumOff val="25000"/>
-                </a:schemeClr>
-              </a:solidFill>
-            </a:endParaRPr>
           </a:p>
         </p:txBody>
       </p:sp>
@@ -30702,14 +30631,6 @@
               </a:rPr>
               <a:t>…</a:t>
             </a:r>
-            <a:endParaRPr lang="en-US" altLang="ja-JP" sz="1100" dirty="0" smtClean="0">
-              <a:solidFill>
-                <a:schemeClr val="tx1">
-                  <a:lumMod val="75000"/>
-                  <a:lumOff val="25000"/>
-                </a:schemeClr>
-              </a:solidFill>
-            </a:endParaRPr>
           </a:p>
         </p:txBody>
       </p:sp>
@@ -30746,14 +30667,6 @@
               </a:rPr>
               <a:t>Dictionary Attribute</a:t>
             </a:r>
-            <a:endParaRPr lang="en-US" altLang="ja-JP" sz="1100" dirty="0" smtClean="0">
-              <a:solidFill>
-                <a:schemeClr val="tx1">
-                  <a:lumMod val="75000"/>
-                  <a:lumOff val="25000"/>
-                </a:schemeClr>
-              </a:solidFill>
-            </a:endParaRPr>
           </a:p>
         </p:txBody>
       </p:sp>
@@ -31066,14 +30979,6 @@
               </a:rPr>
               <a:t>…</a:t>
             </a:r>
-            <a:endParaRPr lang="en-US" altLang="ja-JP" sz="1100" dirty="0" smtClean="0">
-              <a:solidFill>
-                <a:schemeClr val="tx1">
-                  <a:lumMod val="75000"/>
-                  <a:lumOff val="25000"/>
-                </a:schemeClr>
-              </a:solidFill>
-            </a:endParaRPr>
           </a:p>
         </p:txBody>
       </p:sp>
@@ -31121,14 +31026,6 @@
               </a:rPr>
               <a:t>ecord</a:t>
             </a:r>
-            <a:endParaRPr lang="en-US" altLang="ja-JP" sz="1100" dirty="0" smtClean="0">
-              <a:solidFill>
-                <a:schemeClr val="tx1">
-                  <a:lumMod val="75000"/>
-                  <a:lumOff val="25000"/>
-                </a:schemeClr>
-              </a:solidFill>
-            </a:endParaRPr>
           </a:p>
         </p:txBody>
       </p:sp>
@@ -31441,14 +31338,6 @@
               </a:rPr>
               <a:t>…</a:t>
             </a:r>
-            <a:endParaRPr lang="en-US" altLang="ja-JP" sz="1100" dirty="0" smtClean="0">
-              <a:solidFill>
-                <a:schemeClr val="tx1">
-                  <a:lumMod val="75000"/>
-                  <a:lumOff val="25000"/>
-                </a:schemeClr>
-              </a:solidFill>
-            </a:endParaRPr>
           </a:p>
         </p:txBody>
       </p:sp>
@@ -31496,14 +31385,6 @@
               </a:rPr>
               <a:t>ecord</a:t>
             </a:r>
-            <a:endParaRPr lang="en-US" altLang="ja-JP" sz="1100" dirty="0" smtClean="0">
-              <a:solidFill>
-                <a:schemeClr val="tx1">
-                  <a:lumMod val="75000"/>
-                  <a:lumOff val="25000"/>
-                </a:schemeClr>
-              </a:solidFill>
-            </a:endParaRPr>
           </a:p>
         </p:txBody>
       </p:sp>
@@ -31789,14 +31670,6 @@
               </a:rPr>
               <a:t>…</a:t>
             </a:r>
-            <a:endParaRPr lang="en-US" altLang="ja-JP" sz="1100" dirty="0" smtClean="0">
-              <a:solidFill>
-                <a:schemeClr val="tx1">
-                  <a:lumMod val="75000"/>
-                  <a:lumOff val="25000"/>
-                </a:schemeClr>
-              </a:solidFill>
-            </a:endParaRPr>
           </a:p>
         </p:txBody>
       </p:sp>
@@ -32762,14 +32635,6 @@
               </a:rPr>
               <a:t>Dictionary</a:t>
             </a:r>
-            <a:endParaRPr lang="en-US" altLang="ja-JP" sz="1100" dirty="0" smtClean="0">
-              <a:solidFill>
-                <a:schemeClr val="tx1">
-                  <a:lumMod val="75000"/>
-                  <a:lumOff val="25000"/>
-                </a:schemeClr>
-              </a:solidFill>
-            </a:endParaRPr>
           </a:p>
         </p:txBody>
       </p:sp>
@@ -33388,14 +33253,6 @@
               </a:rPr>
               <a:t>…</a:t>
             </a:r>
-            <a:endParaRPr lang="en-US" altLang="ja-JP" sz="1100" dirty="0" smtClean="0">
-              <a:solidFill>
-                <a:schemeClr val="tx1">
-                  <a:lumMod val="75000"/>
-                  <a:lumOff val="25000"/>
-                </a:schemeClr>
-              </a:solidFill>
-            </a:endParaRPr>
           </a:p>
         </p:txBody>
       </p:sp>
@@ -33443,14 +33300,6 @@
               </a:rPr>
               <a:t>ecord</a:t>
             </a:r>
-            <a:endParaRPr lang="en-US" altLang="ja-JP" sz="1100" dirty="0" smtClean="0">
-              <a:solidFill>
-                <a:schemeClr val="tx1">
-                  <a:lumMod val="75000"/>
-                  <a:lumOff val="25000"/>
-                </a:schemeClr>
-              </a:solidFill>
-            </a:endParaRPr>
           </a:p>
         </p:txBody>
       </p:sp>
@@ -33487,14 +33336,6 @@
               </a:rPr>
               <a:t>…</a:t>
             </a:r>
-            <a:endParaRPr lang="en-US" altLang="ja-JP" sz="1100" dirty="0" smtClean="0">
-              <a:solidFill>
-                <a:schemeClr val="tx1">
-                  <a:lumMod val="75000"/>
-                  <a:lumOff val="25000"/>
-                </a:schemeClr>
-              </a:solidFill>
-            </a:endParaRPr>
           </a:p>
         </p:txBody>
       </p:sp>
@@ -33807,14 +33648,6 @@
               </a:rPr>
               <a:t>…</a:t>
             </a:r>
-            <a:endParaRPr lang="en-US" altLang="ja-JP" sz="1100" dirty="0" smtClean="0">
-              <a:solidFill>
-                <a:schemeClr val="tx1">
-                  <a:lumMod val="75000"/>
-                  <a:lumOff val="25000"/>
-                </a:schemeClr>
-              </a:solidFill>
-            </a:endParaRPr>
           </a:p>
         </p:txBody>
       </p:sp>
@@ -33862,14 +33695,6 @@
               </a:rPr>
               <a:t>ecord</a:t>
             </a:r>
-            <a:endParaRPr lang="en-US" altLang="ja-JP" sz="1100" dirty="0" smtClean="0">
-              <a:solidFill>
-                <a:schemeClr val="tx1">
-                  <a:lumMod val="75000"/>
-                  <a:lumOff val="25000"/>
-                </a:schemeClr>
-              </a:solidFill>
-            </a:endParaRPr>
           </a:p>
         </p:txBody>
       </p:sp>
@@ -34182,6 +34007,1354 @@
               </a:rPr>
               <a:t>…</a:t>
             </a:r>
+          </a:p>
+        </p:txBody>
+      </p:sp>
+      <p:sp>
+        <p:nvSpPr>
+          <p:cNvPr id="221" name="テキスト ボックス 220"/>
+          <p:cNvSpPr txBox="1"/>
+          <p:nvPr/>
+        </p:nvSpPr>
+        <p:spPr>
+          <a:xfrm>
+            <a:off x="1175340" y="6103767"/>
+            <a:ext cx="592178" cy="261610"/>
+          </a:xfrm>
+          <a:prstGeom prst="rect">
+            <a:avLst/>
+          </a:prstGeom>
+          <a:noFill/>
+        </p:spPr>
+        <p:txBody>
+          <a:bodyPr wrap="square" rtlCol="0">
+            <a:spAutoFit/>
+          </a:bodyPr>
+          <a:lstStyle/>
+          <a:p>
+            <a:r>
+              <a:rPr lang="en-US" altLang="ja-JP" sz="1100" dirty="0">
+                <a:solidFill>
+                  <a:schemeClr val="tx1">
+                    <a:lumMod val="75000"/>
+                    <a:lumOff val="25000"/>
+                  </a:schemeClr>
+                </a:solidFill>
+              </a:rPr>
+              <a:t>R</a:t>
+            </a:r>
+            <a:r>
+              <a:rPr lang="en-US" altLang="ja-JP" sz="1100" dirty="0" smtClean="0">
+                <a:solidFill>
+                  <a:schemeClr val="tx1">
+                    <a:lumMod val="75000"/>
+                    <a:lumOff val="25000"/>
+                  </a:schemeClr>
+                </a:solidFill>
+              </a:rPr>
+              <a:t>ecord</a:t>
+            </a:r>
+          </a:p>
+        </p:txBody>
+      </p:sp>
+      <p:sp>
+        <p:nvSpPr>
+          <p:cNvPr id="16" name="右矢印 15"/>
+          <p:cNvSpPr/>
+          <p:nvPr/>
+        </p:nvSpPr>
+        <p:spPr>
+          <a:xfrm>
+            <a:off x="3995936" y="5199676"/>
+            <a:ext cx="648072" cy="427556"/>
+          </a:xfrm>
+          <a:prstGeom prst="rightArrow">
+            <a:avLst/>
+          </a:prstGeom>
+          <a:solidFill>
+            <a:schemeClr val="bg2"/>
+          </a:solidFill>
+          <a:ln>
+            <a:solidFill>
+              <a:schemeClr val="tx1">
+                <a:lumMod val="75000"/>
+                <a:lumOff val="25000"/>
+              </a:schemeClr>
+            </a:solidFill>
+          </a:ln>
+        </p:spPr>
+        <p:style>
+          <a:lnRef idx="2">
+            <a:schemeClr val="accent1">
+              <a:shade val="50000"/>
+            </a:schemeClr>
+          </a:lnRef>
+          <a:fillRef idx="1">
+            <a:schemeClr val="accent1"/>
+          </a:fillRef>
+          <a:effectRef idx="0">
+            <a:schemeClr val="accent1"/>
+          </a:effectRef>
+          <a:fontRef idx="minor">
+            <a:schemeClr val="lt1"/>
+          </a:fontRef>
+        </p:style>
+        <p:txBody>
+          <a:bodyPr rtlCol="0" anchor="ctr"/>
+          <a:lstStyle/>
+          <a:p>
+            <a:pPr algn="ctr"/>
+            <a:r>
+              <a:rPr kumimoji="1" lang="en-US" altLang="ja-JP" sz="1200" dirty="0" smtClean="0">
+                <a:solidFill>
+                  <a:schemeClr val="tx1">
+                    <a:lumMod val="75000"/>
+                    <a:lumOff val="25000"/>
+                  </a:schemeClr>
+                </a:solidFill>
+              </a:rPr>
+              <a:t>store</a:t>
+            </a:r>
+            <a:endParaRPr kumimoji="1" lang="ja-JP" altLang="en-US" sz="1200" dirty="0" err="1" smtClean="0">
+              <a:solidFill>
+                <a:schemeClr val="tx1">
+                  <a:lumMod val="75000"/>
+                  <a:lumOff val="25000"/>
+                </a:schemeClr>
+              </a:solidFill>
+            </a:endParaRPr>
+          </a:p>
+        </p:txBody>
+      </p:sp>
+      <p:sp>
+        <p:nvSpPr>
+          <p:cNvPr id="223" name="テキスト ボックス 222"/>
+          <p:cNvSpPr txBox="1"/>
+          <p:nvPr/>
+        </p:nvSpPr>
+        <p:spPr>
+          <a:xfrm>
+            <a:off x="1919754" y="1988840"/>
+            <a:ext cx="815428" cy="261610"/>
+          </a:xfrm>
+          <a:prstGeom prst="rect">
+            <a:avLst/>
+          </a:prstGeom>
+          <a:noFill/>
+        </p:spPr>
+        <p:txBody>
+          <a:bodyPr wrap="square" rtlCol="0">
+            <a:spAutoFit/>
+          </a:bodyPr>
+          <a:lstStyle/>
+          <a:p>
+            <a:r>
+              <a:rPr lang="en-US" altLang="ja-JP" sz="1100" dirty="0" smtClean="0">
+                <a:solidFill>
+                  <a:schemeClr val="tx1">
+                    <a:lumMod val="75000"/>
+                    <a:lumOff val="25000"/>
+                  </a:schemeClr>
+                </a:solidFill>
+              </a:rPr>
+              <a:t>Dictionary</a:t>
+            </a:r>
+          </a:p>
+        </p:txBody>
+      </p:sp>
+      <p:sp>
+        <p:nvSpPr>
+          <p:cNvPr id="224" name="テキスト ボックス 223"/>
+          <p:cNvSpPr txBox="1"/>
+          <p:nvPr/>
+        </p:nvSpPr>
+        <p:spPr>
+          <a:xfrm>
+            <a:off x="2023737" y="4877923"/>
+            <a:ext cx="815428" cy="261610"/>
+          </a:xfrm>
+          <a:prstGeom prst="rect">
+            <a:avLst/>
+          </a:prstGeom>
+          <a:noFill/>
+        </p:spPr>
+        <p:txBody>
+          <a:bodyPr wrap="square" rtlCol="0">
+            <a:spAutoFit/>
+          </a:bodyPr>
+          <a:lstStyle/>
+          <a:p>
+            <a:r>
+              <a:rPr lang="en-US" altLang="ja-JP" sz="1100" dirty="0" smtClean="0">
+                <a:solidFill>
+                  <a:schemeClr val="tx1">
+                    <a:lumMod val="75000"/>
+                    <a:lumOff val="25000"/>
+                  </a:schemeClr>
+                </a:solidFill>
+              </a:rPr>
+              <a:t>Dictionary</a:t>
+            </a:r>
+          </a:p>
+        </p:txBody>
+      </p:sp>
+      <p:cxnSp>
+        <p:nvCxnSpPr>
+          <p:cNvPr id="225" name="カギ線コネクタ 224"/>
+          <p:cNvCxnSpPr>
+            <a:stCxn id="152" idx="2"/>
+            <a:endCxn id="153" idx="0"/>
+          </p:cNvCxnSpPr>
+          <p:nvPr/>
+        </p:nvCxnSpPr>
+        <p:spPr>
+          <a:xfrm rot="16200000" flipH="1">
+            <a:off x="6768197" y="4346847"/>
+            <a:ext cx="231194" cy="56932"/>
+          </a:xfrm>
+          <a:prstGeom prst="bentConnector3">
+            <a:avLst>
+              <a:gd name="adj1" fmla="val 50000"/>
+            </a:avLst>
+          </a:prstGeom>
+          <a:ln w="6350">
+            <a:solidFill>
+              <a:schemeClr val="tx1">
+                <a:lumMod val="75000"/>
+                <a:lumOff val="25000"/>
+              </a:schemeClr>
+            </a:solidFill>
+            <a:tailEnd type="none"/>
+          </a:ln>
+        </p:spPr>
+        <p:style>
+          <a:lnRef idx="1">
+            <a:schemeClr val="accent1"/>
+          </a:lnRef>
+          <a:fillRef idx="0">
+            <a:schemeClr val="accent1"/>
+          </a:fillRef>
+          <a:effectRef idx="0">
+            <a:schemeClr val="accent1"/>
+          </a:effectRef>
+          <a:fontRef idx="minor">
+            <a:schemeClr val="tx1"/>
+          </a:fontRef>
+        </p:style>
+      </p:cxnSp>
+    </p:spTree>
+    <p:extLst>
+      <p:ext uri="{BB962C8B-B14F-4D97-AF65-F5344CB8AC3E}">
+        <p14:creationId xmlns:p14="http://schemas.microsoft.com/office/powerpoint/2010/main" val="1560045246"/>
+      </p:ext>
+    </p:extLst>
+  </p:cSld>
+  <p:clrMapOvr>
+    <a:masterClrMapping/>
+  </p:clrMapOvr>
+  <p:timing>
+    <p:tnLst>
+      <p:par>
+        <p:cTn id="1" dur="indefinite" restart="never" nodeType="tmRoot"/>
+      </p:par>
+    </p:tnLst>
+  </p:timing>
+</p:sld>
+</file>
+
+<file path=ppt/slides/slide18.xml><?xml version="1.0" encoding="utf-8"?>
+<p:sld xmlns:a="http://schemas.openxmlformats.org/drawingml/2006/main" xmlns:r="http://schemas.openxmlformats.org/officeDocument/2006/relationships" xmlns:p="http://schemas.openxmlformats.org/presentationml/2006/main">
+  <p:cSld>
+    <p:spTree>
+      <p:nvGrpSpPr>
+        <p:cNvPr id="1" name=""/>
+        <p:cNvGrpSpPr/>
+        <p:nvPr/>
+      </p:nvGrpSpPr>
+      <p:grpSpPr>
+        <a:xfrm>
+          <a:off x="0" y="0"/>
+          <a:ext cx="0" cy="0"/>
+          <a:chOff x="0" y="0"/>
+          <a:chExt cx="0" cy="0"/>
+        </a:xfrm>
+      </p:grpSpPr>
+      <p:sp>
+        <p:nvSpPr>
+          <p:cNvPr id="2" name="タイトル 1"/>
+          <p:cNvSpPr>
+            <a:spLocks noGrp="1"/>
+          </p:cNvSpPr>
+          <p:nvPr>
+            <p:ph type="title"/>
+          </p:nvPr>
+        </p:nvSpPr>
+        <p:spPr/>
+        <p:txBody>
+          <a:bodyPr>
+            <a:normAutofit/>
+          </a:bodyPr>
+          <a:lstStyle/>
+          <a:p>
+            <a:r>
+              <a:rPr lang="en-US" altLang="ja-JP" dirty="0" err="1" smtClean="0"/>
+              <a:t>dict</a:t>
+            </a:r>
+            <a:r>
+              <a:rPr kumimoji="1" lang="en-US" altLang="ja-JP" dirty="0" smtClean="0"/>
+              <a:t>: </a:t>
+            </a:r>
+            <a:r>
+              <a:rPr kumimoji="1" lang="en-US" altLang="ja-JP" dirty="0" smtClean="0"/>
+              <a:t>writer &amp; </a:t>
+            </a:r>
+            <a:r>
+              <a:rPr kumimoji="1" lang="en-US" altLang="ja-JP" dirty="0" err="1" smtClean="0"/>
+              <a:t>deployer</a:t>
+            </a:r>
+            <a:endParaRPr kumimoji="1" lang="ja-JP" altLang="en-US" dirty="0"/>
+          </a:p>
+        </p:txBody>
+      </p:sp>
+      <p:sp>
+        <p:nvSpPr>
+          <p:cNvPr id="96" name="正方形/長方形 95"/>
+          <p:cNvSpPr/>
+          <p:nvPr/>
+        </p:nvSpPr>
+        <p:spPr>
+          <a:xfrm>
+            <a:off x="395536" y="2780928"/>
+            <a:ext cx="1061279" cy="936104"/>
+          </a:xfrm>
+          <a:prstGeom prst="rect">
+            <a:avLst/>
+          </a:prstGeom>
+          <a:solidFill>
+            <a:schemeClr val="bg2"/>
+          </a:solidFill>
+          <a:ln>
+            <a:solidFill>
+              <a:schemeClr val="tx1">
+                <a:lumMod val="75000"/>
+                <a:lumOff val="25000"/>
+              </a:schemeClr>
+            </a:solidFill>
+          </a:ln>
+        </p:spPr>
+        <p:style>
+          <a:lnRef idx="2">
+            <a:schemeClr val="accent1">
+              <a:shade val="50000"/>
+            </a:schemeClr>
+          </a:lnRef>
+          <a:fillRef idx="1">
+            <a:schemeClr val="accent1"/>
+          </a:fillRef>
+          <a:effectRef idx="0">
+            <a:schemeClr val="accent1"/>
+          </a:effectRef>
+          <a:fontRef idx="minor">
+            <a:schemeClr val="lt1"/>
+          </a:fontRef>
+        </p:style>
+        <p:txBody>
+          <a:bodyPr rot="0" spcFirstLastPara="0" vertOverflow="overflow" horzOverflow="overflow" vert="horz" wrap="square" lIns="91440" tIns="45720" rIns="91440" bIns="45720" numCol="1" spcCol="0" rtlCol="0" fromWordArt="0" anchor="ctr" anchorCtr="0" forceAA="0" compatLnSpc="1">
+            <a:prstTxWarp prst="textNoShape">
+              <a:avLst/>
+            </a:prstTxWarp>
+            <a:noAutofit/>
+          </a:bodyPr>
+          <a:lstStyle/>
+          <a:p>
+            <a:pPr algn="ctr"/>
+            <a:endParaRPr kumimoji="1" lang="en-US" altLang="ja-JP" b="1" dirty="0" smtClean="0">
+              <a:solidFill>
+                <a:schemeClr val="tx1">
+                  <a:lumMod val="75000"/>
+                  <a:lumOff val="25000"/>
+                </a:schemeClr>
+              </a:solidFill>
+            </a:endParaRPr>
+          </a:p>
+        </p:txBody>
+      </p:sp>
+      <p:sp>
+        <p:nvSpPr>
+          <p:cNvPr id="100" name="円柱 99"/>
+          <p:cNvSpPr/>
+          <p:nvPr/>
+        </p:nvSpPr>
+        <p:spPr>
+          <a:xfrm>
+            <a:off x="1763688" y="3045901"/>
+            <a:ext cx="972108" cy="633640"/>
+          </a:xfrm>
+          <a:prstGeom prst="can">
+            <a:avLst/>
+          </a:prstGeom>
+          <a:solidFill>
+            <a:schemeClr val="bg2"/>
+          </a:solidFill>
+          <a:ln>
+            <a:solidFill>
+              <a:schemeClr val="tx1">
+                <a:lumMod val="75000"/>
+                <a:lumOff val="25000"/>
+              </a:schemeClr>
+            </a:solidFill>
+          </a:ln>
+        </p:spPr>
+        <p:style>
+          <a:lnRef idx="2">
+            <a:schemeClr val="accent1">
+              <a:shade val="50000"/>
+            </a:schemeClr>
+          </a:lnRef>
+          <a:fillRef idx="1">
+            <a:schemeClr val="accent1"/>
+          </a:fillRef>
+          <a:effectRef idx="0">
+            <a:schemeClr val="accent1"/>
+          </a:effectRef>
+          <a:fontRef idx="minor">
+            <a:schemeClr val="lt1"/>
+          </a:fontRef>
+        </p:style>
+        <p:txBody>
+          <a:bodyPr rtlCol="0" anchor="ctr"/>
+          <a:lstStyle/>
+          <a:p>
+            <a:pPr algn="ctr"/>
+            <a:r>
+              <a:rPr kumimoji="1" lang="en-US" altLang="ja-JP" sz="1400" dirty="0" smtClean="0">
+                <a:solidFill>
+                  <a:schemeClr val="tx1">
+                    <a:lumMod val="75000"/>
+                    <a:lumOff val="25000"/>
+                  </a:schemeClr>
+                </a:solidFill>
+              </a:rPr>
+              <a:t>Dictionary</a:t>
+            </a:r>
+          </a:p>
+          <a:p>
+            <a:pPr algn="ctr"/>
+            <a:r>
+              <a:rPr kumimoji="1" lang="en-US" altLang="ja-JP" sz="1400" dirty="0" smtClean="0">
+                <a:solidFill>
+                  <a:schemeClr val="tx1">
+                    <a:lumMod val="75000"/>
+                    <a:lumOff val="25000"/>
+                  </a:schemeClr>
+                </a:solidFill>
+              </a:rPr>
+              <a:t>Job #1</a:t>
+            </a:r>
+          </a:p>
+        </p:txBody>
+      </p:sp>
+      <p:cxnSp>
+        <p:nvCxnSpPr>
+          <p:cNvPr id="101" name="カギ線コネクタ 100"/>
+          <p:cNvCxnSpPr>
+            <a:stCxn id="112" idx="3"/>
+            <a:endCxn id="100" idx="2"/>
+          </p:cNvCxnSpPr>
+          <p:nvPr/>
+        </p:nvCxnSpPr>
+        <p:spPr>
+          <a:xfrm>
+            <a:off x="1240791" y="3331327"/>
+            <a:ext cx="522897" cy="31394"/>
+          </a:xfrm>
+          <a:prstGeom prst="bentConnector3">
+            <a:avLst>
+              <a:gd name="adj1" fmla="val 50000"/>
+            </a:avLst>
+          </a:prstGeom>
+          <a:ln w="15875">
+            <a:solidFill>
+              <a:schemeClr val="tx1">
+                <a:lumMod val="75000"/>
+                <a:lumOff val="25000"/>
+              </a:schemeClr>
+            </a:solidFill>
+            <a:tailEnd type="arrow"/>
+          </a:ln>
+        </p:spPr>
+        <p:style>
+          <a:lnRef idx="1">
+            <a:schemeClr val="accent1"/>
+          </a:lnRef>
+          <a:fillRef idx="0">
+            <a:schemeClr val="accent1"/>
+          </a:fillRef>
+          <a:effectRef idx="0">
+            <a:schemeClr val="accent1"/>
+          </a:effectRef>
+          <a:fontRef idx="minor">
+            <a:schemeClr val="tx1"/>
+          </a:fontRef>
+        </p:style>
+      </p:cxnSp>
+      <p:sp>
+        <p:nvSpPr>
+          <p:cNvPr id="102" name="正方形/長方形 101"/>
+          <p:cNvSpPr/>
+          <p:nvPr/>
+        </p:nvSpPr>
+        <p:spPr>
+          <a:xfrm>
+            <a:off x="1456815" y="1731118"/>
+            <a:ext cx="4915385" cy="464781"/>
+          </a:xfrm>
+          <a:prstGeom prst="rect">
+            <a:avLst/>
+          </a:prstGeom>
+          <a:solidFill>
+            <a:schemeClr val="bg2"/>
+          </a:solidFill>
+          <a:ln>
+            <a:solidFill>
+              <a:schemeClr val="tx1">
+                <a:lumMod val="75000"/>
+                <a:lumOff val="25000"/>
+              </a:schemeClr>
+            </a:solidFill>
+          </a:ln>
+        </p:spPr>
+        <p:style>
+          <a:lnRef idx="2">
+            <a:schemeClr val="accent1">
+              <a:shade val="50000"/>
+            </a:schemeClr>
+          </a:lnRef>
+          <a:fillRef idx="1">
+            <a:schemeClr val="accent1"/>
+          </a:fillRef>
+          <a:effectRef idx="0">
+            <a:schemeClr val="accent1"/>
+          </a:effectRef>
+          <a:fontRef idx="minor">
+            <a:schemeClr val="lt1"/>
+          </a:fontRef>
+        </p:style>
+        <p:txBody>
+          <a:bodyPr rot="0" spcFirstLastPara="0" vertOverflow="overflow" horzOverflow="overflow" vert="horz" wrap="square" lIns="91440" tIns="45720" rIns="91440" bIns="45720" numCol="1" spcCol="0" rtlCol="0" fromWordArt="0" anchor="ctr" anchorCtr="0" forceAA="0" compatLnSpc="1">
+            <a:prstTxWarp prst="textNoShape">
+              <a:avLst/>
+            </a:prstTxWarp>
+            <a:noAutofit/>
+          </a:bodyPr>
+          <a:lstStyle/>
+          <a:p>
+            <a:pPr algn="ctr"/>
+            <a:endParaRPr kumimoji="1" lang="en-US" altLang="ja-JP" b="1" dirty="0" smtClean="0">
+              <a:solidFill>
+                <a:schemeClr val="tx1">
+                  <a:lumMod val="75000"/>
+                  <a:lumOff val="25000"/>
+                </a:schemeClr>
+              </a:solidFill>
+            </a:endParaRPr>
+          </a:p>
+        </p:txBody>
+      </p:sp>
+      <p:grpSp>
+        <p:nvGrpSpPr>
+          <p:cNvPr id="26" name="グループ化 25"/>
+          <p:cNvGrpSpPr/>
+          <p:nvPr/>
+        </p:nvGrpSpPr>
+        <p:grpSpPr>
+          <a:xfrm>
+            <a:off x="1547664" y="1613964"/>
+            <a:ext cx="536435" cy="589952"/>
+            <a:chOff x="3203848" y="1484784"/>
+            <a:chExt cx="720080" cy="870811"/>
+          </a:xfrm>
+        </p:grpSpPr>
+        <p:sp>
+          <p:nvSpPr>
+            <p:cNvPr id="24" name="正方形/長方形 23"/>
+            <p:cNvSpPr/>
+            <p:nvPr/>
+          </p:nvSpPr>
+          <p:spPr>
+            <a:xfrm>
+              <a:off x="3203848" y="1484784"/>
+              <a:ext cx="720080" cy="870811"/>
+            </a:xfrm>
+            <a:prstGeom prst="rect">
+              <a:avLst/>
+            </a:prstGeom>
+            <a:noFill/>
+            <a:ln>
+              <a:noFill/>
+            </a:ln>
+          </p:spPr>
+          <p:style>
+            <a:lnRef idx="2">
+              <a:schemeClr val="accent1">
+                <a:shade val="50000"/>
+              </a:schemeClr>
+            </a:lnRef>
+            <a:fillRef idx="1">
+              <a:schemeClr val="accent1"/>
+            </a:fillRef>
+            <a:effectRef idx="0">
+              <a:schemeClr val="accent1"/>
+            </a:effectRef>
+            <a:fontRef idx="minor">
+              <a:schemeClr val="lt1"/>
+            </a:fontRef>
+          </p:style>
+          <p:txBody>
+            <a:bodyPr rtlCol="0" anchor="ctr"/>
+            <a:lstStyle/>
+            <a:p>
+              <a:pPr algn="ctr"/>
+              <a:endParaRPr kumimoji="1" lang="ja-JP" altLang="en-US" sz="1200" dirty="0" err="1" smtClean="0">
+                <a:solidFill>
+                  <a:schemeClr val="tx1">
+                    <a:lumMod val="75000"/>
+                    <a:lumOff val="25000"/>
+                  </a:schemeClr>
+                </a:solidFill>
+              </a:endParaRPr>
+            </a:p>
+          </p:txBody>
+        </p:sp>
+        <p:grpSp>
+          <p:nvGrpSpPr>
+            <p:cNvPr id="103" name="グループ化 102"/>
+            <p:cNvGrpSpPr/>
+            <p:nvPr/>
+          </p:nvGrpSpPr>
+          <p:grpSpPr>
+            <a:xfrm>
+              <a:off x="3404876" y="1657712"/>
+              <a:ext cx="294681" cy="533309"/>
+              <a:chOff x="7229647" y="1574794"/>
+              <a:chExt cx="150665" cy="299283"/>
+            </a:xfrm>
+          </p:grpSpPr>
+          <p:sp>
+            <p:nvSpPr>
+              <p:cNvPr id="104" name="フローチャート : 結合子 103"/>
+              <p:cNvSpPr/>
+              <p:nvPr/>
+            </p:nvSpPr>
+            <p:spPr>
+              <a:xfrm>
+                <a:off x="7229647" y="1574794"/>
+                <a:ext cx="150418" cy="126014"/>
+              </a:xfrm>
+              <a:prstGeom prst="flowChartConnector">
+                <a:avLst/>
+              </a:prstGeom>
+              <a:solidFill>
+                <a:schemeClr val="bg1"/>
+              </a:solidFill>
+              <a:ln w="12700">
+                <a:solidFill>
+                  <a:schemeClr val="tx1">
+                    <a:lumMod val="75000"/>
+                    <a:lumOff val="25000"/>
+                  </a:schemeClr>
+                </a:solidFill>
+              </a:ln>
+            </p:spPr>
+            <p:style>
+              <a:lnRef idx="2">
+                <a:schemeClr val="accent1">
+                  <a:shade val="50000"/>
+                </a:schemeClr>
+              </a:lnRef>
+              <a:fillRef idx="1">
+                <a:schemeClr val="accent1"/>
+              </a:fillRef>
+              <a:effectRef idx="0">
+                <a:schemeClr val="accent1"/>
+              </a:effectRef>
+              <a:fontRef idx="minor">
+                <a:schemeClr val="lt1"/>
+              </a:fontRef>
+            </p:style>
+            <p:txBody>
+              <a:bodyPr rot="0" spcFirstLastPara="0" vertOverflow="overflow" horzOverflow="overflow" vert="horz" wrap="square" lIns="91440" tIns="45720" rIns="91440" bIns="45720" numCol="1" spcCol="0" rtlCol="0" fromWordArt="0" anchor="ctr" anchorCtr="0" forceAA="0" compatLnSpc="1">
+                <a:prstTxWarp prst="textNoShape">
+                  <a:avLst/>
+                </a:prstTxWarp>
+                <a:noAutofit/>
+              </a:bodyPr>
+              <a:lstStyle/>
+              <a:p>
+                <a:pPr algn="ctr"/>
+                <a:endParaRPr kumimoji="1" lang="ja-JP" altLang="en-US" dirty="0" smtClean="0">
+                  <a:solidFill>
+                    <a:schemeClr val="tx1">
+                      <a:lumMod val="75000"/>
+                      <a:lumOff val="25000"/>
+                    </a:schemeClr>
+                  </a:solidFill>
+                </a:endParaRPr>
+              </a:p>
+            </p:txBody>
+          </p:sp>
+          <p:cxnSp>
+            <p:nvCxnSpPr>
+              <p:cNvPr id="105" name="直線コネクタ 104"/>
+              <p:cNvCxnSpPr/>
+              <p:nvPr/>
+            </p:nvCxnSpPr>
+            <p:spPr>
+              <a:xfrm>
+                <a:off x="7229647" y="1759314"/>
+                <a:ext cx="150418" cy="0"/>
+              </a:xfrm>
+              <a:prstGeom prst="line">
+                <a:avLst/>
+              </a:prstGeom>
+              <a:ln w="12700">
+                <a:solidFill>
+                  <a:schemeClr val="tx1">
+                    <a:lumMod val="75000"/>
+                    <a:lumOff val="25000"/>
+                  </a:schemeClr>
+                </a:solidFill>
+                <a:tailEnd type="none"/>
+              </a:ln>
+            </p:spPr>
+            <p:style>
+              <a:lnRef idx="1">
+                <a:schemeClr val="accent1"/>
+              </a:lnRef>
+              <a:fillRef idx="0">
+                <a:schemeClr val="accent1"/>
+              </a:fillRef>
+              <a:effectRef idx="0">
+                <a:schemeClr val="accent1"/>
+              </a:effectRef>
+              <a:fontRef idx="minor">
+                <a:schemeClr val="tx1"/>
+              </a:fontRef>
+            </p:style>
+          </p:cxnSp>
+          <p:cxnSp>
+            <p:nvCxnSpPr>
+              <p:cNvPr id="106" name="直線コネクタ 105"/>
+              <p:cNvCxnSpPr>
+                <a:stCxn id="104" idx="4"/>
+              </p:cNvCxnSpPr>
+              <p:nvPr/>
+            </p:nvCxnSpPr>
+            <p:spPr>
+              <a:xfrm>
+                <a:off x="7304856" y="1700808"/>
+                <a:ext cx="1" cy="117013"/>
+              </a:xfrm>
+              <a:prstGeom prst="line">
+                <a:avLst/>
+              </a:prstGeom>
+              <a:ln w="12700">
+                <a:solidFill>
+                  <a:schemeClr val="tx1">
+                    <a:lumMod val="75000"/>
+                    <a:lumOff val="25000"/>
+                  </a:schemeClr>
+                </a:solidFill>
+                <a:tailEnd type="none"/>
+              </a:ln>
+            </p:spPr>
+            <p:style>
+              <a:lnRef idx="1">
+                <a:schemeClr val="accent1"/>
+              </a:lnRef>
+              <a:fillRef idx="0">
+                <a:schemeClr val="accent1"/>
+              </a:fillRef>
+              <a:effectRef idx="0">
+                <a:schemeClr val="accent1"/>
+              </a:effectRef>
+              <a:fontRef idx="minor">
+                <a:schemeClr val="tx1"/>
+              </a:fontRef>
+            </p:style>
+          </p:cxnSp>
+          <p:cxnSp>
+            <p:nvCxnSpPr>
+              <p:cNvPr id="107" name="直線コネクタ 106"/>
+              <p:cNvCxnSpPr/>
+              <p:nvPr/>
+            </p:nvCxnSpPr>
+            <p:spPr>
+              <a:xfrm flipH="1">
+                <a:off x="7229647" y="1808820"/>
+                <a:ext cx="75210" cy="65257"/>
+              </a:xfrm>
+              <a:prstGeom prst="line">
+                <a:avLst/>
+              </a:prstGeom>
+              <a:ln w="12700">
+                <a:solidFill>
+                  <a:schemeClr val="tx1">
+                    <a:lumMod val="75000"/>
+                    <a:lumOff val="25000"/>
+                  </a:schemeClr>
+                </a:solidFill>
+                <a:tailEnd type="none"/>
+              </a:ln>
+            </p:spPr>
+            <p:style>
+              <a:lnRef idx="1">
+                <a:schemeClr val="accent1"/>
+              </a:lnRef>
+              <a:fillRef idx="0">
+                <a:schemeClr val="accent1"/>
+              </a:fillRef>
+              <a:effectRef idx="0">
+                <a:schemeClr val="accent1"/>
+              </a:effectRef>
+              <a:fontRef idx="minor">
+                <a:schemeClr val="tx1"/>
+              </a:fontRef>
+            </p:style>
+          </p:cxnSp>
+          <p:cxnSp>
+            <p:nvCxnSpPr>
+              <p:cNvPr id="108" name="直線コネクタ 107"/>
+              <p:cNvCxnSpPr/>
+              <p:nvPr/>
+            </p:nvCxnSpPr>
+            <p:spPr>
+              <a:xfrm>
+                <a:off x="7304857" y="1808820"/>
+                <a:ext cx="75455" cy="65257"/>
+              </a:xfrm>
+              <a:prstGeom prst="line">
+                <a:avLst/>
+              </a:prstGeom>
+              <a:ln w="12700">
+                <a:solidFill>
+                  <a:schemeClr val="tx1">
+                    <a:lumMod val="75000"/>
+                    <a:lumOff val="25000"/>
+                  </a:schemeClr>
+                </a:solidFill>
+                <a:tailEnd type="none"/>
+              </a:ln>
+            </p:spPr>
+            <p:style>
+              <a:lnRef idx="1">
+                <a:schemeClr val="accent1"/>
+              </a:lnRef>
+              <a:fillRef idx="0">
+                <a:schemeClr val="accent1"/>
+              </a:fillRef>
+              <a:effectRef idx="0">
+                <a:schemeClr val="accent1"/>
+              </a:effectRef>
+              <a:fontRef idx="minor">
+                <a:schemeClr val="tx1"/>
+              </a:fontRef>
+            </p:style>
+          </p:cxnSp>
+        </p:grpSp>
+      </p:grpSp>
+      <p:sp>
+        <p:nvSpPr>
+          <p:cNvPr id="111" name="角丸四角形 110"/>
+          <p:cNvSpPr/>
+          <p:nvPr/>
+        </p:nvSpPr>
+        <p:spPr>
+          <a:xfrm>
+            <a:off x="592719" y="3061664"/>
+            <a:ext cx="216024" cy="576064"/>
+          </a:xfrm>
+          <a:prstGeom prst="roundRect">
+            <a:avLst/>
+          </a:prstGeom>
+          <a:solidFill>
+            <a:schemeClr val="accent3">
+              <a:lumMod val="20000"/>
+              <a:lumOff val="80000"/>
+            </a:schemeClr>
+          </a:solidFill>
+          <a:ln w="9525">
+            <a:solidFill>
+              <a:schemeClr val="tx1">
+                <a:lumMod val="75000"/>
+                <a:lumOff val="25000"/>
+              </a:schemeClr>
+            </a:solidFill>
+          </a:ln>
+        </p:spPr>
+        <p:style>
+          <a:lnRef idx="2">
+            <a:schemeClr val="accent1">
+              <a:shade val="50000"/>
+            </a:schemeClr>
+          </a:lnRef>
+          <a:fillRef idx="1">
+            <a:schemeClr val="accent1"/>
+          </a:fillRef>
+          <a:effectRef idx="0">
+            <a:schemeClr val="accent1"/>
+          </a:effectRef>
+          <a:fontRef idx="minor">
+            <a:schemeClr val="lt1"/>
+          </a:fontRef>
+        </p:style>
+        <p:txBody>
+          <a:bodyPr rot="0" spcFirstLastPara="0" vertOverflow="overflow" horzOverflow="overflow" vert="horz" wrap="square" lIns="91440" tIns="45720" rIns="91440" bIns="45720" numCol="1" spcCol="0" rtlCol="0" fromWordArt="0" anchor="ctr" anchorCtr="0" forceAA="0" compatLnSpc="1">
+            <a:prstTxWarp prst="textNoShape">
+              <a:avLst/>
+            </a:prstTxWarp>
+            <a:noAutofit/>
+          </a:bodyPr>
+          <a:lstStyle/>
+          <a:p>
+            <a:pPr algn="ctr"/>
+            <a:endParaRPr kumimoji="1" lang="ja-JP" altLang="en-US" dirty="0" smtClean="0">
+              <a:solidFill>
+                <a:schemeClr val="tx1">
+                  <a:lumMod val="75000"/>
+                  <a:lumOff val="25000"/>
+                </a:schemeClr>
+              </a:solidFill>
+            </a:endParaRPr>
+          </a:p>
+        </p:txBody>
+      </p:sp>
+      <p:sp>
+        <p:nvSpPr>
+          <p:cNvPr id="112" name="角丸四角形 111"/>
+          <p:cNvSpPr/>
+          <p:nvPr/>
+        </p:nvSpPr>
+        <p:spPr>
+          <a:xfrm>
+            <a:off x="1024767" y="3043295"/>
+            <a:ext cx="216024" cy="576064"/>
+          </a:xfrm>
+          <a:prstGeom prst="roundRect">
+            <a:avLst/>
+          </a:prstGeom>
+          <a:solidFill>
+            <a:schemeClr val="accent3">
+              <a:lumMod val="20000"/>
+              <a:lumOff val="80000"/>
+            </a:schemeClr>
+          </a:solidFill>
+          <a:ln w="9525">
+            <a:solidFill>
+              <a:schemeClr val="tx1">
+                <a:lumMod val="75000"/>
+                <a:lumOff val="25000"/>
+              </a:schemeClr>
+            </a:solidFill>
+          </a:ln>
+        </p:spPr>
+        <p:style>
+          <a:lnRef idx="2">
+            <a:schemeClr val="accent1">
+              <a:shade val="50000"/>
+            </a:schemeClr>
+          </a:lnRef>
+          <a:fillRef idx="1">
+            <a:schemeClr val="accent1"/>
+          </a:fillRef>
+          <a:effectRef idx="0">
+            <a:schemeClr val="accent1"/>
+          </a:effectRef>
+          <a:fontRef idx="minor">
+            <a:schemeClr val="lt1"/>
+          </a:fontRef>
+        </p:style>
+        <p:txBody>
+          <a:bodyPr rot="0" spcFirstLastPara="0" vertOverflow="overflow" horzOverflow="overflow" vert="horz" wrap="square" lIns="91440" tIns="45720" rIns="91440" bIns="45720" numCol="1" spcCol="0" rtlCol="0" fromWordArt="0" anchor="ctr" anchorCtr="0" forceAA="0" compatLnSpc="1">
+            <a:prstTxWarp prst="textNoShape">
+              <a:avLst/>
+            </a:prstTxWarp>
+            <a:noAutofit/>
+          </a:bodyPr>
+          <a:lstStyle/>
+          <a:p>
+            <a:pPr algn="ctr"/>
+            <a:endParaRPr kumimoji="1" lang="ja-JP" altLang="en-US" dirty="0" smtClean="0">
+              <a:solidFill>
+                <a:schemeClr val="tx1">
+                  <a:lumMod val="75000"/>
+                  <a:lumOff val="25000"/>
+                </a:schemeClr>
+              </a:solidFill>
+            </a:endParaRPr>
+          </a:p>
+        </p:txBody>
+      </p:sp>
+      <p:cxnSp>
+        <p:nvCxnSpPr>
+          <p:cNvPr id="116" name="直線矢印コネクタ 115"/>
+          <p:cNvCxnSpPr>
+            <a:stCxn id="111" idx="3"/>
+          </p:cNvCxnSpPr>
+          <p:nvPr/>
+        </p:nvCxnSpPr>
+        <p:spPr>
+          <a:xfrm>
+            <a:off x="808743" y="3349696"/>
+            <a:ext cx="216024" cy="0"/>
+          </a:xfrm>
+          <a:prstGeom prst="straightConnector1">
+            <a:avLst/>
+          </a:prstGeom>
+          <a:ln w="15875">
+            <a:solidFill>
+              <a:schemeClr val="tx1">
+                <a:lumMod val="75000"/>
+                <a:lumOff val="25000"/>
+              </a:schemeClr>
+            </a:solidFill>
+            <a:tailEnd type="arrow"/>
+          </a:ln>
+        </p:spPr>
+        <p:style>
+          <a:lnRef idx="1">
+            <a:schemeClr val="accent1"/>
+          </a:lnRef>
+          <a:fillRef idx="0">
+            <a:schemeClr val="accent1"/>
+          </a:fillRef>
+          <a:effectRef idx="0">
+            <a:schemeClr val="accent1"/>
+          </a:effectRef>
+          <a:fontRef idx="minor">
+            <a:schemeClr val="tx1"/>
+          </a:fontRef>
+        </p:style>
+      </p:cxnSp>
+      <p:cxnSp>
+        <p:nvCxnSpPr>
+          <p:cNvPr id="120" name="カギ線コネクタ 119"/>
+          <p:cNvCxnSpPr>
+            <a:endCxn id="100" idx="1"/>
+          </p:cNvCxnSpPr>
+          <p:nvPr/>
+        </p:nvCxnSpPr>
+        <p:spPr>
+          <a:xfrm rot="16200000" flipH="1">
+            <a:off x="1706876" y="2503034"/>
+            <a:ext cx="841985" cy="243747"/>
+          </a:xfrm>
+          <a:prstGeom prst="bentConnector3">
+            <a:avLst>
+              <a:gd name="adj1" fmla="val 50000"/>
+            </a:avLst>
+          </a:prstGeom>
+          <a:ln w="6350">
+            <a:solidFill>
+              <a:schemeClr val="tx1">
+                <a:lumMod val="75000"/>
+                <a:lumOff val="25000"/>
+              </a:schemeClr>
+            </a:solidFill>
+            <a:tailEnd type="arrow"/>
+          </a:ln>
+        </p:spPr>
+        <p:style>
+          <a:lnRef idx="1">
+            <a:schemeClr val="accent1"/>
+          </a:lnRef>
+          <a:fillRef idx="0">
+            <a:schemeClr val="accent1"/>
+          </a:fillRef>
+          <a:effectRef idx="0">
+            <a:schemeClr val="accent1"/>
+          </a:effectRef>
+          <a:fontRef idx="minor">
+            <a:schemeClr val="tx1"/>
+          </a:fontRef>
+        </p:style>
+      </p:cxnSp>
+      <p:cxnSp>
+        <p:nvCxnSpPr>
+          <p:cNvPr id="91" name="カギ線コネクタ 90"/>
+          <p:cNvCxnSpPr>
+            <a:stCxn id="100" idx="4"/>
+            <a:endCxn id="50" idx="1"/>
+          </p:cNvCxnSpPr>
+          <p:nvPr/>
+        </p:nvCxnSpPr>
+        <p:spPr>
+          <a:xfrm flipV="1">
+            <a:off x="2735796" y="3062870"/>
+            <a:ext cx="396044" cy="299851"/>
+          </a:xfrm>
+          <a:prstGeom prst="bentConnector3">
+            <a:avLst>
+              <a:gd name="adj1" fmla="val 50000"/>
+            </a:avLst>
+          </a:prstGeom>
+          <a:ln w="6350">
+            <a:solidFill>
+              <a:schemeClr val="tx1">
+                <a:lumMod val="75000"/>
+                <a:lumOff val="25000"/>
+              </a:schemeClr>
+            </a:solidFill>
+            <a:tailEnd type="arrow"/>
+          </a:ln>
+        </p:spPr>
+        <p:style>
+          <a:lnRef idx="1">
+            <a:schemeClr val="accent1"/>
+          </a:lnRef>
+          <a:fillRef idx="0">
+            <a:schemeClr val="accent1"/>
+          </a:fillRef>
+          <a:effectRef idx="0">
+            <a:schemeClr val="accent1"/>
+          </a:effectRef>
+          <a:fontRef idx="minor">
+            <a:schemeClr val="tx1"/>
+          </a:fontRef>
+        </p:style>
+      </p:cxnSp>
+      <p:sp>
+        <p:nvSpPr>
+          <p:cNvPr id="167" name="テキスト ボックス 166"/>
+          <p:cNvSpPr txBox="1"/>
+          <p:nvPr/>
+        </p:nvSpPr>
+        <p:spPr>
+          <a:xfrm>
+            <a:off x="611560" y="2780928"/>
+            <a:ext cx="720080" cy="276999"/>
+          </a:xfrm>
+          <a:prstGeom prst="rect">
+            <a:avLst/>
+          </a:prstGeom>
+          <a:noFill/>
+        </p:spPr>
+        <p:txBody>
+          <a:bodyPr wrap="square" rtlCol="0">
+            <a:spAutoFit/>
+          </a:bodyPr>
+          <a:lstStyle/>
+          <a:p>
+            <a:r>
+              <a:rPr lang="en-US" altLang="ja-JP" sz="1200" dirty="0" smtClean="0">
+                <a:solidFill>
+                  <a:schemeClr val="tx1">
+                    <a:lumMod val="75000"/>
+                    <a:lumOff val="25000"/>
+                  </a:schemeClr>
+                </a:solidFill>
+              </a:rPr>
+              <a:t>Job #1</a:t>
+            </a:r>
+          </a:p>
+        </p:txBody>
+      </p:sp>
+      <p:sp>
+        <p:nvSpPr>
+          <p:cNvPr id="172" name="テキスト ボックス 171"/>
+          <p:cNvSpPr txBox="1"/>
+          <p:nvPr/>
+        </p:nvSpPr>
+        <p:spPr>
+          <a:xfrm>
+            <a:off x="3653593" y="2363297"/>
+            <a:ext cx="990415" cy="276999"/>
+          </a:xfrm>
+          <a:prstGeom prst="rect">
+            <a:avLst/>
+          </a:prstGeom>
+          <a:noFill/>
+        </p:spPr>
+        <p:txBody>
+          <a:bodyPr wrap="square" rtlCol="0">
+            <a:spAutoFit/>
+          </a:bodyPr>
+          <a:lstStyle/>
+          <a:p>
+            <a:r>
+              <a:rPr lang="en-US" altLang="ja-JP" sz="1200" b="1" dirty="0" smtClean="0">
+                <a:solidFill>
+                  <a:schemeClr val="tx1">
+                    <a:lumMod val="75000"/>
+                    <a:lumOff val="25000"/>
+                  </a:schemeClr>
+                </a:solidFill>
+              </a:rPr>
+              <a:t>Download</a:t>
+            </a:r>
+            <a:endParaRPr lang="en-US" altLang="ja-JP" sz="1200" b="1" dirty="0" smtClean="0">
+              <a:solidFill>
+                <a:schemeClr val="tx1">
+                  <a:lumMod val="75000"/>
+                  <a:lumOff val="25000"/>
+                </a:schemeClr>
+              </a:solidFill>
+            </a:endParaRPr>
+          </a:p>
+        </p:txBody>
+      </p:sp>
+      <p:sp>
+        <p:nvSpPr>
+          <p:cNvPr id="187" name="テキスト ボックス 186"/>
+          <p:cNvSpPr txBox="1"/>
+          <p:nvPr/>
+        </p:nvSpPr>
+        <p:spPr>
+          <a:xfrm>
+            <a:off x="1918230" y="1769210"/>
+            <a:ext cx="1152128" cy="369332"/>
+          </a:xfrm>
+          <a:prstGeom prst="rect">
+            <a:avLst/>
+          </a:prstGeom>
+          <a:noFill/>
+        </p:spPr>
+        <p:txBody>
+          <a:bodyPr wrap="square" rtlCol="0">
+            <a:spAutoFit/>
+          </a:bodyPr>
+          <a:lstStyle/>
+          <a:p>
+            <a:r>
+              <a:rPr lang="en-US" altLang="ja-JP" b="1" dirty="0" smtClean="0">
+                <a:solidFill>
+                  <a:schemeClr val="tx1">
+                    <a:lumMod val="75000"/>
+                    <a:lumOff val="25000"/>
+                  </a:schemeClr>
+                </a:solidFill>
+              </a:rPr>
+              <a:t>GUI Tool</a:t>
+            </a:r>
+          </a:p>
+        </p:txBody>
+      </p:sp>
+      <p:sp>
+        <p:nvSpPr>
+          <p:cNvPr id="49" name="メモ 48"/>
+          <p:cNvSpPr/>
+          <p:nvPr/>
+        </p:nvSpPr>
+        <p:spPr>
+          <a:xfrm>
+            <a:off x="4423249" y="2780928"/>
+            <a:ext cx="1084855" cy="581793"/>
+          </a:xfrm>
+          <a:prstGeom prst="foldedCorner">
+            <a:avLst/>
+          </a:prstGeom>
+          <a:solidFill>
+            <a:schemeClr val="bg2"/>
+          </a:solidFill>
+          <a:ln>
+            <a:solidFill>
+              <a:schemeClr val="tx1">
+                <a:lumMod val="65000"/>
+                <a:lumOff val="35000"/>
+              </a:schemeClr>
+            </a:solidFill>
+          </a:ln>
+        </p:spPr>
+        <p:style>
+          <a:lnRef idx="2">
+            <a:schemeClr val="accent1">
+              <a:shade val="50000"/>
+            </a:schemeClr>
+          </a:lnRef>
+          <a:fillRef idx="1">
+            <a:schemeClr val="accent1"/>
+          </a:fillRef>
+          <a:effectRef idx="0">
+            <a:schemeClr val="accent1"/>
+          </a:effectRef>
+          <a:fontRef idx="minor">
+            <a:schemeClr val="lt1"/>
+          </a:fontRef>
+        </p:style>
+        <p:txBody>
+          <a:bodyPr rtlCol="0" anchor="ctr"/>
+          <a:lstStyle/>
+          <a:p>
+            <a:pPr algn="ctr"/>
+            <a:r>
+              <a:rPr lang="en-US" altLang="ja-JP" sz="1100" dirty="0" smtClean="0">
+                <a:solidFill>
+                  <a:schemeClr val="tx1">
+                    <a:lumMod val="75000"/>
+                    <a:lumOff val="25000"/>
+                  </a:schemeClr>
+                </a:solidFill>
+              </a:rPr>
+              <a:t>result</a:t>
+            </a:r>
+            <a:r>
+              <a:rPr lang="en-US" altLang="ja-JP" sz="1100" dirty="0" smtClean="0">
+                <a:solidFill>
+                  <a:schemeClr val="tx1">
+                    <a:lumMod val="75000"/>
+                    <a:lumOff val="25000"/>
+                  </a:schemeClr>
+                </a:solidFill>
+              </a:rPr>
+              <a:t>-dict.txt</a:t>
+            </a:r>
+          </a:p>
+          <a:p>
+            <a:pPr algn="ctr"/>
+            <a:r>
+              <a:rPr lang="en-US" altLang="ja-JP" sz="1100" dirty="0" smtClean="0">
+                <a:solidFill>
+                  <a:schemeClr val="tx1">
+                    <a:lumMod val="75000"/>
+                    <a:lumOff val="25000"/>
+                  </a:schemeClr>
+                </a:solidFill>
+              </a:rPr>
+              <a:t>(Csv, </a:t>
+            </a:r>
+            <a:r>
+              <a:rPr lang="en-US" altLang="ja-JP" sz="1100" dirty="0" err="1">
+                <a:solidFill>
+                  <a:schemeClr val="tx1">
+                    <a:lumMod val="75000"/>
+                    <a:lumOff val="25000"/>
+                  </a:schemeClr>
+                </a:solidFill>
+              </a:rPr>
+              <a:t>J</a:t>
+            </a:r>
+            <a:r>
+              <a:rPr lang="en-US" altLang="ja-JP" sz="1100" dirty="0" err="1" smtClean="0">
+                <a:solidFill>
+                  <a:schemeClr val="tx1">
+                    <a:lumMod val="75000"/>
+                    <a:lumOff val="25000"/>
+                  </a:schemeClr>
+                </a:solidFill>
+              </a:rPr>
+              <a:t>son</a:t>
+            </a:r>
+            <a:r>
+              <a:rPr lang="en-US" altLang="ja-JP" sz="1100" dirty="0" smtClean="0">
+                <a:solidFill>
+                  <a:schemeClr val="tx1">
+                    <a:lumMod val="75000"/>
+                    <a:lumOff val="25000"/>
+                  </a:schemeClr>
+                </a:solidFill>
+              </a:rPr>
+              <a:t>,…)</a:t>
+            </a:r>
             <a:endParaRPr lang="en-US" altLang="ja-JP" sz="1100" dirty="0" smtClean="0">
               <a:solidFill>
                 <a:schemeClr val="tx1">
@@ -34195,37 +35368,276 @@
       </p:sp>
       <p:sp>
         <p:nvSpPr>
-          <p:cNvPr id="221" name="テキスト ボックス 220"/>
-          <p:cNvSpPr txBox="1"/>
-          <p:nvPr/>
-        </p:nvSpPr>
-        <p:spPr>
-          <a:xfrm>
-            <a:off x="1175340" y="6103767"/>
-            <a:ext cx="592178" cy="261610"/>
+          <p:cNvPr id="50" name="正方形/長方形 49"/>
+          <p:cNvSpPr/>
+          <p:nvPr/>
+        </p:nvSpPr>
+        <p:spPr>
+          <a:xfrm>
+            <a:off x="3131840" y="2774711"/>
+            <a:ext cx="864096" cy="576318"/>
           </a:xfrm>
           <a:prstGeom prst="rect">
             <a:avLst/>
           </a:prstGeom>
-          <a:noFill/>
-        </p:spPr>
-        <p:txBody>
-          <a:bodyPr wrap="square" rtlCol="0">
-            <a:spAutoFit/>
+          <a:solidFill>
+            <a:schemeClr val="bg2"/>
+          </a:solidFill>
+          <a:ln>
+            <a:solidFill>
+              <a:schemeClr val="tx1">
+                <a:lumMod val="75000"/>
+                <a:lumOff val="25000"/>
+              </a:schemeClr>
+            </a:solidFill>
+          </a:ln>
+        </p:spPr>
+        <p:style>
+          <a:lnRef idx="2">
+            <a:schemeClr val="accent1">
+              <a:shade val="50000"/>
+            </a:schemeClr>
+          </a:lnRef>
+          <a:fillRef idx="1">
+            <a:schemeClr val="accent1"/>
+          </a:fillRef>
+          <a:effectRef idx="0">
+            <a:schemeClr val="accent1"/>
+          </a:effectRef>
+          <a:fontRef idx="minor">
+            <a:schemeClr val="lt1"/>
+          </a:fontRef>
+        </p:style>
+        <p:txBody>
+          <a:bodyPr rot="0" spcFirstLastPara="0" vertOverflow="overflow" horzOverflow="overflow" vert="horz" wrap="square" lIns="91440" tIns="45720" rIns="91440" bIns="45720" numCol="1" spcCol="0" rtlCol="0" fromWordArt="0" anchor="ctr" anchorCtr="0" forceAA="0" compatLnSpc="1">
+            <a:prstTxWarp prst="textNoShape">
+              <a:avLst/>
+            </a:prstTxWarp>
+            <a:noAutofit/>
           </a:bodyPr>
           <a:lstStyle/>
           <a:p>
-            <a:r>
-              <a:rPr lang="en-US" altLang="ja-JP" sz="1100" dirty="0">
-                <a:solidFill>
-                  <a:schemeClr val="tx1">
-                    <a:lumMod val="75000"/>
-                    <a:lumOff val="25000"/>
-                  </a:schemeClr>
-                </a:solidFill>
-              </a:rPr>
-              <a:t>R</a:t>
-            </a:r>
+            <a:pPr algn="ctr"/>
+            <a:r>
+              <a:rPr lang="en-US" altLang="ja-JP" sz="1400" b="1" dirty="0" smtClean="0">
+                <a:solidFill>
+                  <a:schemeClr val="tx1">
+                    <a:lumMod val="75000"/>
+                    <a:lumOff val="25000"/>
+                  </a:schemeClr>
+                </a:solidFill>
+              </a:rPr>
+              <a:t>Writer</a:t>
+            </a:r>
+            <a:endParaRPr lang="en-US" altLang="ja-JP" sz="1400" b="1" dirty="0">
+              <a:solidFill>
+                <a:schemeClr val="tx1">
+                  <a:lumMod val="75000"/>
+                  <a:lumOff val="25000"/>
+                </a:schemeClr>
+              </a:solidFill>
+            </a:endParaRPr>
+          </a:p>
+        </p:txBody>
+      </p:sp>
+      <p:cxnSp>
+        <p:nvCxnSpPr>
+          <p:cNvPr id="57" name="カギ線コネクタ 56"/>
+          <p:cNvCxnSpPr>
+            <a:stCxn id="50" idx="3"/>
+            <a:endCxn id="49" idx="1"/>
+          </p:cNvCxnSpPr>
+          <p:nvPr/>
+        </p:nvCxnSpPr>
+        <p:spPr>
+          <a:xfrm>
+            <a:off x="3995936" y="3062870"/>
+            <a:ext cx="427313" cy="8955"/>
+          </a:xfrm>
+          <a:prstGeom prst="bentConnector3">
+            <a:avLst>
+              <a:gd name="adj1" fmla="val 50000"/>
+            </a:avLst>
+          </a:prstGeom>
+          <a:ln w="6350">
+            <a:solidFill>
+              <a:schemeClr val="tx1">
+                <a:lumMod val="75000"/>
+                <a:lumOff val="25000"/>
+              </a:schemeClr>
+            </a:solidFill>
+            <a:tailEnd type="arrow"/>
+          </a:ln>
+        </p:spPr>
+        <p:style>
+          <a:lnRef idx="1">
+            <a:schemeClr val="accent1"/>
+          </a:lnRef>
+          <a:fillRef idx="0">
+            <a:schemeClr val="accent1"/>
+          </a:fillRef>
+          <a:effectRef idx="0">
+            <a:schemeClr val="accent1"/>
+          </a:effectRef>
+          <a:fontRef idx="minor">
+            <a:schemeClr val="tx1"/>
+          </a:fontRef>
+        </p:style>
+      </p:cxnSp>
+      <p:sp>
+        <p:nvSpPr>
+          <p:cNvPr id="61" name="正方形/長方形 60"/>
+          <p:cNvSpPr/>
+          <p:nvPr/>
+        </p:nvSpPr>
+        <p:spPr>
+          <a:xfrm>
+            <a:off x="6948264" y="2896040"/>
+            <a:ext cx="1368152" cy="809210"/>
+          </a:xfrm>
+          <a:prstGeom prst="rect">
+            <a:avLst/>
+          </a:prstGeom>
+          <a:solidFill>
+            <a:schemeClr val="bg2"/>
+          </a:solidFill>
+          <a:ln>
+            <a:solidFill>
+              <a:schemeClr val="tx1">
+                <a:lumMod val="75000"/>
+                <a:lumOff val="25000"/>
+              </a:schemeClr>
+            </a:solidFill>
+          </a:ln>
+        </p:spPr>
+        <p:style>
+          <a:lnRef idx="2">
+            <a:schemeClr val="accent1">
+              <a:shade val="50000"/>
+            </a:schemeClr>
+          </a:lnRef>
+          <a:fillRef idx="1">
+            <a:schemeClr val="accent1"/>
+          </a:fillRef>
+          <a:effectRef idx="0">
+            <a:schemeClr val="accent1"/>
+          </a:effectRef>
+          <a:fontRef idx="minor">
+            <a:schemeClr val="lt1"/>
+          </a:fontRef>
+        </p:style>
+        <p:txBody>
+          <a:bodyPr rot="0" spcFirstLastPara="0" vertOverflow="overflow" horzOverflow="overflow" vert="horz" wrap="square" lIns="91440" tIns="45720" rIns="91440" bIns="45720" numCol="1" spcCol="0" rtlCol="0" fromWordArt="0" anchor="ctr" anchorCtr="0" forceAA="0" compatLnSpc="1">
+            <a:prstTxWarp prst="textNoShape">
+              <a:avLst/>
+            </a:prstTxWarp>
+            <a:noAutofit/>
+          </a:bodyPr>
+          <a:lstStyle/>
+          <a:p>
+            <a:pPr algn="ctr"/>
+            <a:r>
+              <a:rPr lang="en-US" altLang="ja-JP" dirty="0" err="1" smtClean="0">
+                <a:solidFill>
+                  <a:schemeClr val="tx1">
+                    <a:lumMod val="75000"/>
+                    <a:lumOff val="25000"/>
+                  </a:schemeClr>
+                </a:solidFill>
+              </a:rPr>
+              <a:t>Solr</a:t>
+            </a:r>
+            <a:r>
+              <a:rPr lang="en-US" altLang="ja-JP" dirty="0" smtClean="0">
+                <a:solidFill>
+                  <a:schemeClr val="tx1">
+                    <a:lumMod val="75000"/>
+                    <a:lumOff val="25000"/>
+                  </a:schemeClr>
+                </a:solidFill>
+              </a:rPr>
+              <a:t> / </a:t>
+            </a:r>
+            <a:r>
+              <a:rPr lang="en-US" altLang="ja-JP" dirty="0" smtClean="0">
+                <a:solidFill>
+                  <a:schemeClr val="tx1">
+                    <a:lumMod val="75000"/>
+                    <a:lumOff val="25000"/>
+                  </a:schemeClr>
+                </a:solidFill>
+              </a:rPr>
+              <a:t>ES</a:t>
+            </a:r>
+            <a:endParaRPr lang="en-US" altLang="ja-JP" b="1" dirty="0">
+              <a:solidFill>
+                <a:schemeClr val="tx1">
+                  <a:lumMod val="75000"/>
+                  <a:lumOff val="25000"/>
+                </a:schemeClr>
+              </a:solidFill>
+            </a:endParaRPr>
+          </a:p>
+          <a:p>
+            <a:pPr algn="ctr"/>
+            <a:endParaRPr kumimoji="1" lang="ja-JP" altLang="en-US" dirty="0" smtClean="0">
+              <a:solidFill>
+                <a:schemeClr val="tx1">
+                  <a:lumMod val="75000"/>
+                  <a:lumOff val="25000"/>
+                </a:schemeClr>
+              </a:solidFill>
+            </a:endParaRPr>
+          </a:p>
+        </p:txBody>
+      </p:sp>
+      <p:sp>
+        <p:nvSpPr>
+          <p:cNvPr id="63" name="メモ 62"/>
+          <p:cNvSpPr/>
+          <p:nvPr/>
+        </p:nvSpPr>
+        <p:spPr>
+          <a:xfrm>
+            <a:off x="7231561" y="3961853"/>
+            <a:ext cx="1084855" cy="331243"/>
+          </a:xfrm>
+          <a:prstGeom prst="foldedCorner">
+            <a:avLst/>
+          </a:prstGeom>
+          <a:solidFill>
+            <a:schemeClr val="bg2"/>
+          </a:solidFill>
+          <a:ln>
+            <a:solidFill>
+              <a:schemeClr val="tx1">
+                <a:lumMod val="65000"/>
+                <a:lumOff val="35000"/>
+              </a:schemeClr>
+            </a:solidFill>
+          </a:ln>
+        </p:spPr>
+        <p:style>
+          <a:lnRef idx="2">
+            <a:schemeClr val="accent1">
+              <a:shade val="50000"/>
+            </a:schemeClr>
+          </a:lnRef>
+          <a:fillRef idx="1">
+            <a:schemeClr val="accent1"/>
+          </a:fillRef>
+          <a:effectRef idx="0">
+            <a:schemeClr val="accent1"/>
+          </a:effectRef>
+          <a:fontRef idx="minor">
+            <a:schemeClr val="lt1"/>
+          </a:fontRef>
+        </p:style>
+        <p:txBody>
+          <a:bodyPr rtlCol="0" anchor="ctr"/>
+          <a:lstStyle/>
+          <a:p>
+            <a:pPr algn="ctr"/>
             <a:r>
               <a:rPr lang="en-US" altLang="ja-JP" sz="1100" dirty="0" smtClean="0">
                 <a:solidFill>
@@ -34235,7 +35647,18 @@
                   </a:schemeClr>
                 </a:solidFill>
               </a:rPr>
-              <a:t>ecord</a:t>
+              <a:t>user</a:t>
+            </a:r>
+            <a:r>
+              <a:rPr lang="en-US" altLang="ja-JP" sz="1100" dirty="0" smtClean="0">
+                <a:solidFill>
+                  <a:schemeClr val="tx1">
+                    <a:lumMod val="75000"/>
+                    <a:lumOff val="25000"/>
+                  </a:schemeClr>
+                </a:solidFill>
+              </a:rPr>
+              <a:t>-dict.txt</a:t>
             </a:r>
             <a:endParaRPr lang="en-US" altLang="ja-JP" sz="1100" dirty="0" smtClean="0">
               <a:solidFill>
@@ -34250,22 +35673,25 @@
       </p:sp>
       <p:sp>
         <p:nvSpPr>
-          <p:cNvPr id="16" name="右矢印 15"/>
+          <p:cNvPr id="65" name="角丸四角形 64"/>
           <p:cNvSpPr/>
           <p:nvPr/>
         </p:nvSpPr>
         <p:spPr>
           <a:xfrm>
-            <a:off x="3995936" y="5199676"/>
-            <a:ext cx="648072" cy="427556"/>
-          </a:xfrm>
-          <a:prstGeom prst="rightArrow">
+            <a:off x="7452320" y="3345210"/>
+            <a:ext cx="315192" cy="239190"/>
+          </a:xfrm>
+          <a:prstGeom prst="roundRect">
             <a:avLst/>
           </a:prstGeom>
           <a:solidFill>
-            <a:schemeClr val="bg2"/>
+            <a:schemeClr val="accent3">
+              <a:lumMod val="20000"/>
+              <a:lumOff val="80000"/>
+            </a:schemeClr>
           </a:solidFill>
-          <a:ln>
+          <a:ln w="9525">
             <a:solidFill>
               <a:schemeClr val="tx1">
                 <a:lumMod val="75000"/>
@@ -34291,22 +35717,16 @@
           </a:fontRef>
         </p:style>
         <p:txBody>
-          <a:bodyPr rtlCol="0" anchor="ctr"/>
+          <a:bodyPr rot="0" spcFirstLastPara="0" vertOverflow="overflow" horzOverflow="overflow" vert="horz" wrap="square" lIns="91440" tIns="45720" rIns="91440" bIns="45720" numCol="1" spcCol="0" rtlCol="0" fromWordArt="0" anchor="ctr" anchorCtr="0" forceAA="0" compatLnSpc="1">
+            <a:prstTxWarp prst="textNoShape">
+              <a:avLst/>
+            </a:prstTxWarp>
+            <a:noAutofit/>
+          </a:bodyPr>
           <a:lstStyle/>
           <a:p>
             <a:pPr algn="ctr"/>
-            <a:r>
-              <a:rPr kumimoji="1" lang="en-US" altLang="ja-JP" sz="1200" dirty="0" smtClean="0">
-                <a:solidFill>
-                  <a:schemeClr val="tx1">
-                    <a:lumMod val="75000"/>
-                    <a:lumOff val="25000"/>
-                  </a:schemeClr>
-                </a:solidFill>
-              </a:rPr>
-              <a:t>store</a:t>
-            </a:r>
-            <a:endParaRPr kumimoji="1" lang="ja-JP" altLang="en-US" sz="1200" dirty="0" err="1" smtClean="0">
+            <a:endParaRPr kumimoji="1" lang="ja-JP" altLang="en-US" dirty="0" smtClean="0">
               <a:solidFill>
                 <a:schemeClr val="tx1">
                   <a:lumMod val="75000"/>
@@ -34319,38 +35739,68 @@
       </p:sp>
       <p:sp>
         <p:nvSpPr>
-          <p:cNvPr id="223" name="テキスト ボックス 222"/>
-          <p:cNvSpPr txBox="1"/>
-          <p:nvPr/>
-        </p:nvSpPr>
-        <p:spPr>
-          <a:xfrm>
-            <a:off x="1919754" y="1988840"/>
-            <a:ext cx="815428" cy="261610"/>
+          <p:cNvPr id="77" name="正方形/長方形 76"/>
+          <p:cNvSpPr/>
+          <p:nvPr/>
+        </p:nvSpPr>
+        <p:spPr>
+          <a:xfrm>
+            <a:off x="5220072" y="3596182"/>
+            <a:ext cx="864096" cy="576318"/>
           </a:xfrm>
           <a:prstGeom prst="rect">
             <a:avLst/>
           </a:prstGeom>
-          <a:noFill/>
-        </p:spPr>
-        <p:txBody>
-          <a:bodyPr wrap="square" rtlCol="0">
-            <a:spAutoFit/>
+          <a:solidFill>
+            <a:schemeClr val="bg2"/>
+          </a:solidFill>
+          <a:ln>
+            <a:solidFill>
+              <a:schemeClr val="tx1">
+                <a:lumMod val="75000"/>
+                <a:lumOff val="25000"/>
+              </a:schemeClr>
+            </a:solidFill>
+          </a:ln>
+        </p:spPr>
+        <p:style>
+          <a:lnRef idx="2">
+            <a:schemeClr val="accent1">
+              <a:shade val="50000"/>
+            </a:schemeClr>
+          </a:lnRef>
+          <a:fillRef idx="1">
+            <a:schemeClr val="accent1"/>
+          </a:fillRef>
+          <a:effectRef idx="0">
+            <a:schemeClr val="accent1"/>
+          </a:effectRef>
+          <a:fontRef idx="minor">
+            <a:schemeClr val="lt1"/>
+          </a:fontRef>
+        </p:style>
+        <p:txBody>
+          <a:bodyPr rot="0" spcFirstLastPara="0" vertOverflow="overflow" horzOverflow="overflow" vert="horz" wrap="square" lIns="91440" tIns="45720" rIns="91440" bIns="45720" numCol="1" spcCol="0" rtlCol="0" fromWordArt="0" anchor="ctr" anchorCtr="0" forceAA="0" compatLnSpc="1">
+            <a:prstTxWarp prst="textNoShape">
+              <a:avLst/>
+            </a:prstTxWarp>
+            <a:noAutofit/>
           </a:bodyPr>
           <a:lstStyle/>
           <a:p>
-            <a:r>
-              <a:rPr lang="en-US" altLang="ja-JP" sz="1100" dirty="0" smtClean="0">
-                <a:solidFill>
-                  <a:schemeClr val="tx1">
-                    <a:lumMod val="75000"/>
-                    <a:lumOff val="25000"/>
-                  </a:schemeClr>
-                </a:solidFill>
-              </a:rPr>
-              <a:t>Dictionary</a:t>
-            </a:r>
-            <a:endParaRPr lang="en-US" altLang="ja-JP" sz="1100" dirty="0" smtClean="0">
+            <a:pPr algn="ctr"/>
+            <a:r>
+              <a:rPr lang="en-US" altLang="ja-JP" sz="1400" b="1" dirty="0" err="1" smtClean="0">
+                <a:solidFill>
+                  <a:schemeClr val="tx1">
+                    <a:lumMod val="75000"/>
+                    <a:lumOff val="25000"/>
+                  </a:schemeClr>
+                </a:solidFill>
+              </a:rPr>
+              <a:t>Deployer</a:t>
+            </a:r>
+            <a:endParaRPr lang="en-US" altLang="ja-JP" sz="1400" b="1" dirty="0">
               <a:solidFill>
                 <a:schemeClr val="tx1">
                   <a:lumMod val="75000"/>
@@ -34361,16 +35811,273 @@
           </a:p>
         </p:txBody>
       </p:sp>
-      <p:sp>
-        <p:nvSpPr>
-          <p:cNvPr id="224" name="テキスト ボックス 223"/>
+      <p:cxnSp>
+        <p:nvCxnSpPr>
+          <p:cNvPr id="78" name="カギ線コネクタ 77"/>
+          <p:cNvCxnSpPr>
+            <a:stCxn id="77" idx="3"/>
+            <a:endCxn id="65" idx="1"/>
+          </p:cNvCxnSpPr>
+          <p:nvPr/>
+        </p:nvCxnSpPr>
+        <p:spPr>
+          <a:xfrm flipV="1">
+            <a:off x="6084168" y="3464805"/>
+            <a:ext cx="1368152" cy="419536"/>
+          </a:xfrm>
+          <a:prstGeom prst="bentConnector3">
+            <a:avLst>
+              <a:gd name="adj1" fmla="val 50000"/>
+            </a:avLst>
+          </a:prstGeom>
+          <a:ln w="6350">
+            <a:solidFill>
+              <a:schemeClr val="tx1">
+                <a:lumMod val="75000"/>
+                <a:lumOff val="25000"/>
+              </a:schemeClr>
+            </a:solidFill>
+            <a:tailEnd type="arrow"/>
+          </a:ln>
+        </p:spPr>
+        <p:style>
+          <a:lnRef idx="1">
+            <a:schemeClr val="accent1"/>
+          </a:lnRef>
+          <a:fillRef idx="0">
+            <a:schemeClr val="accent1"/>
+          </a:fillRef>
+          <a:effectRef idx="0">
+            <a:schemeClr val="accent1"/>
+          </a:effectRef>
+          <a:fontRef idx="minor">
+            <a:schemeClr val="tx1"/>
+          </a:fontRef>
+        </p:style>
+      </p:cxnSp>
+      <p:cxnSp>
+        <p:nvCxnSpPr>
+          <p:cNvPr id="81" name="カギ線コネクタ 80"/>
+          <p:cNvCxnSpPr>
+            <a:stCxn id="65" idx="2"/>
+            <a:endCxn id="63" idx="0"/>
+          </p:cNvCxnSpPr>
+          <p:nvPr/>
+        </p:nvCxnSpPr>
+        <p:spPr>
+          <a:xfrm rot="16200000" flipH="1">
+            <a:off x="7503226" y="3691089"/>
+            <a:ext cx="377453" cy="164073"/>
+          </a:xfrm>
+          <a:prstGeom prst="bentConnector3">
+            <a:avLst>
+              <a:gd name="adj1" fmla="val 50000"/>
+            </a:avLst>
+          </a:prstGeom>
+          <a:ln w="6350">
+            <a:solidFill>
+              <a:schemeClr val="tx1">
+                <a:lumMod val="75000"/>
+                <a:lumOff val="25000"/>
+              </a:schemeClr>
+            </a:solidFill>
+            <a:tailEnd type="arrow"/>
+          </a:ln>
+        </p:spPr>
+        <p:style>
+          <a:lnRef idx="1">
+            <a:schemeClr val="accent1"/>
+          </a:lnRef>
+          <a:fillRef idx="0">
+            <a:schemeClr val="accent1"/>
+          </a:fillRef>
+          <a:effectRef idx="0">
+            <a:schemeClr val="accent1"/>
+          </a:effectRef>
+          <a:fontRef idx="minor">
+            <a:schemeClr val="tx1"/>
+          </a:fontRef>
+        </p:style>
+      </p:cxnSp>
+      <p:cxnSp>
+        <p:nvCxnSpPr>
+          <p:cNvPr id="94" name="カギ線コネクタ 93"/>
+          <p:cNvCxnSpPr>
+            <a:stCxn id="49" idx="2"/>
+            <a:endCxn id="77" idx="1"/>
+          </p:cNvCxnSpPr>
+          <p:nvPr/>
+        </p:nvCxnSpPr>
+        <p:spPr>
+          <a:xfrm rot="16200000" flipH="1">
+            <a:off x="4832064" y="3496333"/>
+            <a:ext cx="521620" cy="254395"/>
+          </a:xfrm>
+          <a:prstGeom prst="bentConnector2">
+            <a:avLst/>
+          </a:prstGeom>
+          <a:ln w="6350">
+            <a:solidFill>
+              <a:schemeClr val="tx1">
+                <a:lumMod val="75000"/>
+                <a:lumOff val="25000"/>
+              </a:schemeClr>
+            </a:solidFill>
+            <a:tailEnd type="arrow"/>
+          </a:ln>
+        </p:spPr>
+        <p:style>
+          <a:lnRef idx="1">
+            <a:schemeClr val="accent1"/>
+          </a:lnRef>
+          <a:fillRef idx="0">
+            <a:schemeClr val="accent1"/>
+          </a:fillRef>
+          <a:effectRef idx="0">
+            <a:schemeClr val="accent1"/>
+          </a:effectRef>
+          <a:fontRef idx="minor">
+            <a:schemeClr val="tx1"/>
+          </a:fontRef>
+        </p:style>
+      </p:cxnSp>
+      <p:cxnSp>
+        <p:nvCxnSpPr>
+          <p:cNvPr id="97" name="カギ線コネクタ 96"/>
+          <p:cNvCxnSpPr>
+            <a:endCxn id="50" idx="0"/>
+          </p:cNvCxnSpPr>
+          <p:nvPr/>
+        </p:nvCxnSpPr>
+        <p:spPr>
+          <a:xfrm rot="5400000">
+            <a:off x="3323346" y="2444461"/>
+            <a:ext cx="570793" cy="89707"/>
+          </a:xfrm>
+          <a:prstGeom prst="bentConnector3">
+            <a:avLst>
+              <a:gd name="adj1" fmla="val 50000"/>
+            </a:avLst>
+          </a:prstGeom>
+          <a:ln w="6350">
+            <a:solidFill>
+              <a:schemeClr val="tx1">
+                <a:lumMod val="75000"/>
+                <a:lumOff val="25000"/>
+              </a:schemeClr>
+            </a:solidFill>
+            <a:tailEnd type="arrow"/>
+          </a:ln>
+        </p:spPr>
+        <p:style>
+          <a:lnRef idx="1">
+            <a:schemeClr val="accent1"/>
+          </a:lnRef>
+          <a:fillRef idx="0">
+            <a:schemeClr val="accent1"/>
+          </a:fillRef>
+          <a:effectRef idx="0">
+            <a:schemeClr val="accent1"/>
+          </a:effectRef>
+          <a:fontRef idx="minor">
+            <a:schemeClr val="tx1"/>
+          </a:fontRef>
+        </p:style>
+      </p:cxnSp>
+      <p:cxnSp>
+        <p:nvCxnSpPr>
+          <p:cNvPr id="109" name="カギ線コネクタ 108"/>
+          <p:cNvCxnSpPr/>
+          <p:nvPr/>
+        </p:nvCxnSpPr>
+        <p:spPr>
+          <a:xfrm rot="16200000" flipV="1">
+            <a:off x="4355501" y="2331586"/>
+            <a:ext cx="577014" cy="321669"/>
+          </a:xfrm>
+          <a:prstGeom prst="bentConnector3">
+            <a:avLst>
+              <a:gd name="adj1" fmla="val 50000"/>
+            </a:avLst>
+          </a:prstGeom>
+          <a:ln w="6350">
+            <a:solidFill>
+              <a:schemeClr val="tx1">
+                <a:lumMod val="75000"/>
+                <a:lumOff val="25000"/>
+              </a:schemeClr>
+            </a:solidFill>
+            <a:tailEnd type="arrow"/>
+          </a:ln>
+        </p:spPr>
+        <p:style>
+          <a:lnRef idx="1">
+            <a:schemeClr val="accent1"/>
+          </a:lnRef>
+          <a:fillRef idx="0">
+            <a:schemeClr val="accent1"/>
+          </a:fillRef>
+          <a:effectRef idx="0">
+            <a:schemeClr val="accent1"/>
+          </a:effectRef>
+          <a:fontRef idx="minor">
+            <a:schemeClr val="tx1"/>
+          </a:fontRef>
+        </p:style>
+      </p:cxnSp>
+      <p:cxnSp>
+        <p:nvCxnSpPr>
+          <p:cNvPr id="114" name="カギ線コネクタ 113"/>
+          <p:cNvCxnSpPr>
+            <a:endCxn id="77" idx="0"/>
+          </p:cNvCxnSpPr>
+          <p:nvPr/>
+        </p:nvCxnSpPr>
+        <p:spPr>
+          <a:xfrm rot="5400000">
+            <a:off x="5059992" y="2788028"/>
+            <a:ext cx="1400283" cy="216025"/>
+          </a:xfrm>
+          <a:prstGeom prst="bentConnector3">
+            <a:avLst>
+              <a:gd name="adj1" fmla="val 50000"/>
+            </a:avLst>
+          </a:prstGeom>
+          <a:ln w="6350">
+            <a:solidFill>
+              <a:schemeClr val="tx1">
+                <a:lumMod val="75000"/>
+                <a:lumOff val="25000"/>
+              </a:schemeClr>
+            </a:solidFill>
+            <a:tailEnd type="arrow"/>
+          </a:ln>
+        </p:spPr>
+        <p:style>
+          <a:lnRef idx="1">
+            <a:schemeClr val="accent1"/>
+          </a:lnRef>
+          <a:fillRef idx="0">
+            <a:schemeClr val="accent1"/>
+          </a:fillRef>
+          <a:effectRef idx="0">
+            <a:schemeClr val="accent1"/>
+          </a:effectRef>
+          <a:fontRef idx="minor">
+            <a:schemeClr val="tx1"/>
+          </a:fontRef>
+        </p:style>
+      </p:cxnSp>
+      <p:sp>
+        <p:nvSpPr>
+          <p:cNvPr id="118" name="テキスト ボックス 117"/>
           <p:cNvSpPr txBox="1"/>
           <p:nvPr/>
         </p:nvSpPr>
         <p:spPr>
           <a:xfrm>
-            <a:off x="2023737" y="4877923"/>
-            <a:ext cx="815428" cy="261610"/>
+            <a:off x="5652120" y="3248980"/>
+            <a:ext cx="990415" cy="276999"/>
           </a:xfrm>
           <a:prstGeom prst="rect">
             <a:avLst/>
@@ -34384,17 +36091,17 @@
           <a:lstStyle/>
           <a:p>
             <a:r>
-              <a:rPr lang="en-US" altLang="ja-JP" sz="1100" dirty="0" smtClean="0">
-                <a:solidFill>
-                  <a:schemeClr val="tx1">
-                    <a:lumMod val="75000"/>
-                    <a:lumOff val="25000"/>
-                  </a:schemeClr>
-                </a:solidFill>
-              </a:rPr>
-              <a:t>Dictionary</a:t>
-            </a:r>
-            <a:endParaRPr lang="en-US" altLang="ja-JP" sz="1100" dirty="0" smtClean="0">
+              <a:rPr lang="en-US" altLang="ja-JP" sz="1200" b="1" dirty="0" smtClean="0">
+                <a:solidFill>
+                  <a:schemeClr val="tx1">
+                    <a:lumMod val="75000"/>
+                    <a:lumOff val="25000"/>
+                  </a:schemeClr>
+                </a:solidFill>
+              </a:rPr>
+              <a:t>Deploy</a:t>
+            </a:r>
+            <a:endParaRPr lang="en-US" altLang="ja-JP" sz="1200" b="1" dirty="0" smtClean="0">
               <a:solidFill>
                 <a:schemeClr val="tx1">
                   <a:lumMod val="75000"/>
@@ -34405,19 +36112,298 @@
           </a:p>
         </p:txBody>
       </p:sp>
+      <p:sp>
+        <p:nvSpPr>
+          <p:cNvPr id="122" name="角丸四角形 121"/>
+          <p:cNvSpPr/>
+          <p:nvPr/>
+        </p:nvSpPr>
+        <p:spPr>
+          <a:xfrm>
+            <a:off x="3645924" y="1883246"/>
+            <a:ext cx="782060" cy="231087"/>
+          </a:xfrm>
+          <a:prstGeom prst="roundRect">
+            <a:avLst/>
+          </a:prstGeom>
+          <a:solidFill>
+            <a:schemeClr val="accent3">
+              <a:lumMod val="20000"/>
+              <a:lumOff val="80000"/>
+            </a:schemeClr>
+          </a:solidFill>
+          <a:ln w="9525">
+            <a:solidFill>
+              <a:schemeClr val="tx1">
+                <a:lumMod val="75000"/>
+                <a:lumOff val="25000"/>
+              </a:schemeClr>
+            </a:solidFill>
+          </a:ln>
+        </p:spPr>
+        <p:style>
+          <a:lnRef idx="2">
+            <a:schemeClr val="accent1">
+              <a:shade val="50000"/>
+            </a:schemeClr>
+          </a:lnRef>
+          <a:fillRef idx="1">
+            <a:schemeClr val="accent1"/>
+          </a:fillRef>
+          <a:effectRef idx="0">
+            <a:schemeClr val="accent1"/>
+          </a:effectRef>
+          <a:fontRef idx="minor">
+            <a:schemeClr val="lt1"/>
+          </a:fontRef>
+        </p:style>
+        <p:txBody>
+          <a:bodyPr rot="0" spcFirstLastPara="0" vertOverflow="overflow" horzOverflow="overflow" vert="horz" wrap="square" lIns="91440" tIns="45720" rIns="91440" bIns="45720" numCol="1" spcCol="0" rtlCol="0" fromWordArt="0" anchor="ctr" anchorCtr="0" forceAA="0" compatLnSpc="1">
+            <a:prstTxWarp prst="textNoShape">
+              <a:avLst/>
+            </a:prstTxWarp>
+            <a:noAutofit/>
+          </a:bodyPr>
+          <a:lstStyle/>
+          <a:p>
+            <a:pPr algn="ctr"/>
+            <a:r>
+              <a:rPr kumimoji="1" lang="en-US" altLang="ja-JP" sz="1050" dirty="0" smtClean="0">
+                <a:solidFill>
+                  <a:schemeClr val="tx1">
+                    <a:lumMod val="75000"/>
+                    <a:lumOff val="25000"/>
+                  </a:schemeClr>
+                </a:solidFill>
+              </a:rPr>
+              <a:t>Download</a:t>
+            </a:r>
+            <a:endParaRPr kumimoji="1" lang="ja-JP" altLang="en-US" sz="1050" dirty="0" smtClean="0">
+              <a:solidFill>
+                <a:schemeClr val="tx1">
+                  <a:lumMod val="75000"/>
+                  <a:lumOff val="25000"/>
+                </a:schemeClr>
+              </a:solidFill>
+            </a:endParaRPr>
+          </a:p>
+        </p:txBody>
+      </p:sp>
+      <p:sp>
+        <p:nvSpPr>
+          <p:cNvPr id="123" name="角丸四角形 122"/>
+          <p:cNvSpPr/>
+          <p:nvPr/>
+        </p:nvSpPr>
+        <p:spPr>
+          <a:xfrm>
+            <a:off x="5365267" y="1892332"/>
+            <a:ext cx="782060" cy="231087"/>
+          </a:xfrm>
+          <a:prstGeom prst="roundRect">
+            <a:avLst/>
+          </a:prstGeom>
+          <a:solidFill>
+            <a:schemeClr val="accent3">
+              <a:lumMod val="20000"/>
+              <a:lumOff val="80000"/>
+            </a:schemeClr>
+          </a:solidFill>
+          <a:ln w="9525">
+            <a:solidFill>
+              <a:schemeClr val="tx1">
+                <a:lumMod val="75000"/>
+                <a:lumOff val="25000"/>
+              </a:schemeClr>
+            </a:solidFill>
+          </a:ln>
+        </p:spPr>
+        <p:style>
+          <a:lnRef idx="2">
+            <a:schemeClr val="accent1">
+              <a:shade val="50000"/>
+            </a:schemeClr>
+          </a:lnRef>
+          <a:fillRef idx="1">
+            <a:schemeClr val="accent1"/>
+          </a:fillRef>
+          <a:effectRef idx="0">
+            <a:schemeClr val="accent1"/>
+          </a:effectRef>
+          <a:fontRef idx="minor">
+            <a:schemeClr val="lt1"/>
+          </a:fontRef>
+        </p:style>
+        <p:txBody>
+          <a:bodyPr rot="0" spcFirstLastPara="0" vertOverflow="overflow" horzOverflow="overflow" vert="horz" wrap="square" lIns="91440" tIns="45720" rIns="91440" bIns="45720" numCol="1" spcCol="0" rtlCol="0" fromWordArt="0" anchor="ctr" anchorCtr="0" forceAA="0" compatLnSpc="1">
+            <a:prstTxWarp prst="textNoShape">
+              <a:avLst/>
+            </a:prstTxWarp>
+            <a:noAutofit/>
+          </a:bodyPr>
+          <a:lstStyle/>
+          <a:p>
+            <a:pPr algn="ctr"/>
+            <a:r>
+              <a:rPr kumimoji="1" lang="en-US" altLang="ja-JP" sz="1050" dirty="0" smtClean="0">
+                <a:solidFill>
+                  <a:schemeClr val="tx1">
+                    <a:lumMod val="75000"/>
+                    <a:lumOff val="25000"/>
+                  </a:schemeClr>
+                </a:solidFill>
+              </a:rPr>
+              <a:t>Deploy</a:t>
+            </a:r>
+            <a:endParaRPr kumimoji="1" lang="ja-JP" altLang="en-US" sz="1050" dirty="0" smtClean="0">
+              <a:solidFill>
+                <a:schemeClr val="tx1">
+                  <a:lumMod val="75000"/>
+                  <a:lumOff val="25000"/>
+                </a:schemeClr>
+              </a:solidFill>
+            </a:endParaRPr>
+          </a:p>
+        </p:txBody>
+      </p:sp>
+      <p:sp>
+        <p:nvSpPr>
+          <p:cNvPr id="126" name="メモ 125"/>
+          <p:cNvSpPr/>
+          <p:nvPr/>
+        </p:nvSpPr>
+        <p:spPr>
+          <a:xfrm>
+            <a:off x="1918230" y="3917863"/>
+            <a:ext cx="629231" cy="509274"/>
+          </a:xfrm>
+          <a:prstGeom prst="foldedCorner">
+            <a:avLst/>
+          </a:prstGeom>
+          <a:solidFill>
+            <a:schemeClr val="bg2"/>
+          </a:solidFill>
+          <a:ln>
+            <a:solidFill>
+              <a:schemeClr val="tx1">
+                <a:lumMod val="65000"/>
+                <a:lumOff val="35000"/>
+              </a:schemeClr>
+            </a:solidFill>
+          </a:ln>
+        </p:spPr>
+        <p:style>
+          <a:lnRef idx="2">
+            <a:schemeClr val="accent1">
+              <a:shade val="50000"/>
+            </a:schemeClr>
+          </a:lnRef>
+          <a:fillRef idx="1">
+            <a:schemeClr val="accent1"/>
+          </a:fillRef>
+          <a:effectRef idx="0">
+            <a:schemeClr val="accent1"/>
+          </a:effectRef>
+          <a:fontRef idx="minor">
+            <a:schemeClr val="lt1"/>
+          </a:fontRef>
+        </p:style>
+        <p:txBody>
+          <a:bodyPr rtlCol="0" anchor="ctr"/>
+          <a:lstStyle/>
+          <a:p>
+            <a:pPr algn="ctr"/>
+            <a:r>
+              <a:rPr lang="en-US" altLang="ja-JP" sz="1200" dirty="0" smtClean="0">
+                <a:solidFill>
+                  <a:schemeClr val="tx1">
+                    <a:lumMod val="75000"/>
+                    <a:lumOff val="25000"/>
+                  </a:schemeClr>
+                </a:solidFill>
+              </a:rPr>
+              <a:t>Job’s</a:t>
+            </a:r>
+          </a:p>
+          <a:p>
+            <a:pPr algn="ctr"/>
+            <a:r>
+              <a:rPr lang="en-US" altLang="ja-JP" sz="1200" dirty="0" err="1" smtClean="0">
+                <a:solidFill>
+                  <a:schemeClr val="tx1">
+                    <a:lumMod val="75000"/>
+                    <a:lumOff val="25000"/>
+                  </a:schemeClr>
+                </a:solidFill>
+              </a:rPr>
+              <a:t>Config</a:t>
+            </a:r>
+            <a:endParaRPr lang="en-US" altLang="ja-JP" sz="1200" dirty="0">
+              <a:solidFill>
+                <a:schemeClr val="tx1">
+                  <a:lumMod val="75000"/>
+                  <a:lumOff val="25000"/>
+                </a:schemeClr>
+              </a:solidFill>
+            </a:endParaRPr>
+          </a:p>
+        </p:txBody>
+      </p:sp>
       <p:cxnSp>
         <p:nvCxnSpPr>
-          <p:cNvPr id="225" name="カギ線コネクタ 224"/>
+          <p:cNvPr id="127" name="カギ線コネクタ 126"/>
           <p:cNvCxnSpPr>
-            <a:stCxn id="152" idx="2"/>
-            <a:endCxn id="153" idx="0"/>
+            <a:stCxn id="126" idx="3"/>
+            <a:endCxn id="50" idx="2"/>
           </p:cNvCxnSpPr>
           <p:nvPr/>
         </p:nvCxnSpPr>
         <p:spPr>
-          <a:xfrm rot="16200000" flipH="1">
-            <a:off x="6768197" y="4346847"/>
-            <a:ext cx="231194" cy="56932"/>
+          <a:xfrm flipV="1">
+            <a:off x="2547461" y="3351029"/>
+            <a:ext cx="1016427" cy="821471"/>
+          </a:xfrm>
+          <a:prstGeom prst="bentConnector2">
+            <a:avLst/>
+          </a:prstGeom>
+          <a:ln w="6350">
+            <a:solidFill>
+              <a:schemeClr val="tx1">
+                <a:lumMod val="75000"/>
+                <a:lumOff val="25000"/>
+              </a:schemeClr>
+            </a:solidFill>
+            <a:prstDash val="dash"/>
+            <a:tailEnd type="none"/>
+          </a:ln>
+        </p:spPr>
+        <p:style>
+          <a:lnRef idx="1">
+            <a:schemeClr val="accent1"/>
+          </a:lnRef>
+          <a:fillRef idx="0">
+            <a:schemeClr val="accent1"/>
+          </a:fillRef>
+          <a:effectRef idx="0">
+            <a:schemeClr val="accent1"/>
+          </a:effectRef>
+          <a:fontRef idx="minor">
+            <a:schemeClr val="tx1"/>
+          </a:fontRef>
+        </p:style>
+      </p:cxnSp>
+      <p:cxnSp>
+        <p:nvCxnSpPr>
+          <p:cNvPr id="130" name="カギ線コネクタ 129"/>
+          <p:cNvCxnSpPr>
+            <a:stCxn id="126" idx="3"/>
+          </p:cNvCxnSpPr>
+          <p:nvPr/>
+        </p:nvCxnSpPr>
+        <p:spPr>
+          <a:xfrm flipV="1">
+            <a:off x="2547461" y="4127475"/>
+            <a:ext cx="2672611" cy="45025"/>
           </a:xfrm>
           <a:prstGeom prst="bentConnector3">
             <a:avLst>
@@ -34431,6 +36417,7 @@
                 <a:lumOff val="25000"/>
               </a:schemeClr>
             </a:solidFill>
+            <a:prstDash val="dash"/>
             <a:tailEnd type="none"/>
           </a:ln>
         </p:spPr>
@@ -34449,10 +36436,144 @@
           </a:fontRef>
         </p:style>
       </p:cxnSp>
+      <p:cxnSp>
+        <p:nvCxnSpPr>
+          <p:cNvPr id="133" name="カギ線コネクタ 132"/>
+          <p:cNvCxnSpPr>
+            <a:stCxn id="126" idx="1"/>
+            <a:endCxn id="96" idx="2"/>
+          </p:cNvCxnSpPr>
+          <p:nvPr/>
+        </p:nvCxnSpPr>
+        <p:spPr>
+          <a:xfrm rot="10800000">
+            <a:off x="926176" y="3717032"/>
+            <a:ext cx="992054" cy="455468"/>
+          </a:xfrm>
+          <a:prstGeom prst="bentConnector2">
+            <a:avLst/>
+          </a:prstGeom>
+          <a:ln w="6350">
+            <a:solidFill>
+              <a:schemeClr val="tx1">
+                <a:lumMod val="75000"/>
+                <a:lumOff val="25000"/>
+              </a:schemeClr>
+            </a:solidFill>
+            <a:prstDash val="dash"/>
+            <a:tailEnd type="none"/>
+          </a:ln>
+        </p:spPr>
+        <p:style>
+          <a:lnRef idx="1">
+            <a:schemeClr val="accent1"/>
+          </a:lnRef>
+          <a:fillRef idx="0">
+            <a:schemeClr val="accent1"/>
+          </a:fillRef>
+          <a:effectRef idx="0">
+            <a:schemeClr val="accent1"/>
+          </a:effectRef>
+          <a:fontRef idx="minor">
+            <a:schemeClr val="tx1"/>
+          </a:fontRef>
+        </p:style>
+      </p:cxnSp>
+      <p:sp>
+        <p:nvSpPr>
+          <p:cNvPr id="137" name="テキスト ボックス 136"/>
+          <p:cNvSpPr txBox="1"/>
+          <p:nvPr/>
+        </p:nvSpPr>
+        <p:spPr>
+          <a:xfrm>
+            <a:off x="2547462" y="4293096"/>
+            <a:ext cx="2389684" cy="430887"/>
+          </a:xfrm>
+          <a:prstGeom prst="rect">
+            <a:avLst/>
+          </a:prstGeom>
+          <a:noFill/>
+        </p:spPr>
+        <p:txBody>
+          <a:bodyPr wrap="square" rtlCol="0">
+            <a:spAutoFit/>
+          </a:bodyPr>
+          <a:lstStyle/>
+          <a:p>
+            <a:r>
+              <a:rPr lang="en-US" altLang="ja-JP" sz="1100" dirty="0" smtClean="0">
+                <a:solidFill>
+                  <a:schemeClr val="tx1">
+                    <a:lumMod val="75000"/>
+                    <a:lumOff val="25000"/>
+                  </a:schemeClr>
+                </a:solidFill>
+              </a:rPr>
+              <a:t>Writer &amp; </a:t>
+            </a:r>
+            <a:r>
+              <a:rPr lang="en-US" altLang="ja-JP" sz="1100" dirty="0" err="1" smtClean="0">
+                <a:solidFill>
+                  <a:schemeClr val="tx1">
+                    <a:lumMod val="75000"/>
+                    <a:lumOff val="25000"/>
+                  </a:schemeClr>
+                </a:solidFill>
+              </a:rPr>
+              <a:t>Deployer</a:t>
+            </a:r>
+            <a:r>
+              <a:rPr lang="en-US" altLang="ja-JP" sz="1100" dirty="0" smtClean="0">
+                <a:solidFill>
+                  <a:schemeClr val="tx1">
+                    <a:lumMod val="75000"/>
+                    <a:lumOff val="25000"/>
+                  </a:schemeClr>
+                </a:solidFill>
+              </a:rPr>
+              <a:t> can </a:t>
+            </a:r>
+            <a:r>
+              <a:rPr lang="en-US" altLang="ja-JP" sz="1100" dirty="0" smtClean="0">
+                <a:solidFill>
+                  <a:schemeClr val="tx1">
+                    <a:lumMod val="75000"/>
+                    <a:lumOff val="25000"/>
+                  </a:schemeClr>
+                </a:solidFill>
+              </a:rPr>
+              <a:t>be configured in the </a:t>
+            </a:r>
+            <a:r>
+              <a:rPr lang="en-US" altLang="ja-JP" sz="1100" dirty="0" err="1" smtClean="0">
+                <a:solidFill>
+                  <a:schemeClr val="tx1">
+                    <a:lumMod val="75000"/>
+                    <a:lumOff val="25000"/>
+                  </a:schemeClr>
+                </a:solidFill>
+              </a:rPr>
+              <a:t>config</a:t>
+            </a:r>
+            <a:r>
+              <a:rPr lang="en-US" altLang="ja-JP" sz="1100" dirty="0" smtClean="0">
+                <a:solidFill>
+                  <a:schemeClr val="tx1">
+                    <a:lumMod val="75000"/>
+                    <a:lumOff val="25000"/>
+                  </a:schemeClr>
+                </a:solidFill>
+              </a:rPr>
+              <a:t> file of  the job.</a:t>
+            </a:r>
+          </a:p>
+        </p:txBody>
+      </p:sp>
     </p:spTree>
     <p:extLst>
       <p:ext uri="{BB962C8B-B14F-4D97-AF65-F5344CB8AC3E}">
-        <p14:creationId xmlns:p14="http://schemas.microsoft.com/office/powerpoint/2010/main" val="1560045246"/>
+        <p14:creationId xmlns:p14="http://schemas.microsoft.com/office/powerpoint/2010/main" val="1756442362"/>
       </p:ext>
     </p:extLst>
   </p:cSld>

</xml_diff>